<commit_message>
Change some contents in powerpoint
</commit_message>
<xml_diff>
--- a/ApresentacaoSpringActuator.pptx
+++ b/ApresentacaoSpringActuator.pptx
@@ -5,35 +5,34 @@
     <p:sldMasterId id="2147483652" r:id="rId1"/>
   </p:sldMasterIdLst>
   <p:notesMasterIdLst>
-    <p:notesMasterId r:id="rId11"/>
+    <p:notesMasterId r:id="rId10"/>
   </p:notesMasterIdLst>
   <p:sldIdLst>
     <p:sldId id="256" r:id="rId2"/>
     <p:sldId id="257" r:id="rId3"/>
     <p:sldId id="258" r:id="rId4"/>
     <p:sldId id="259" r:id="rId5"/>
-    <p:sldId id="261" r:id="rId6"/>
-    <p:sldId id="260" r:id="rId7"/>
-    <p:sldId id="265" r:id="rId8"/>
-    <p:sldId id="264" r:id="rId9"/>
-    <p:sldId id="262" r:id="rId10"/>
+    <p:sldId id="260" r:id="rId6"/>
+    <p:sldId id="265" r:id="rId7"/>
+    <p:sldId id="264" r:id="rId8"/>
+    <p:sldId id="262" r:id="rId9"/>
   </p:sldIdLst>
   <p:sldSz cx="9144000" cy="5143500" type="screen16x9"/>
   <p:notesSz cx="6858000" cy="9144000"/>
   <p:embeddedFontLst>
     <p:embeddedFont>
       <p:font typeface="Roboto" panose="02000000000000000000" pitchFamily="2" charset="0"/>
-      <p:regular r:id="rId12"/>
-      <p:bold r:id="rId13"/>
-      <p:italic r:id="rId14"/>
-      <p:boldItalic r:id="rId15"/>
+      <p:regular r:id="rId11"/>
+      <p:bold r:id="rId12"/>
+      <p:italic r:id="rId13"/>
+      <p:boldItalic r:id="rId14"/>
     </p:embeddedFont>
     <p:embeddedFont>
       <p:font typeface="Roboto Light" panose="02000000000000000000" pitchFamily="2" charset="0"/>
-      <p:regular r:id="rId16"/>
-      <p:bold r:id="rId17"/>
-      <p:italic r:id="rId18"/>
-      <p:boldItalic r:id="rId19"/>
+      <p:regular r:id="rId15"/>
+      <p:bold r:id="rId16"/>
+      <p:italic r:id="rId17"/>
+      <p:boldItalic r:id="rId18"/>
     </p:embeddedFont>
   </p:embeddedFontLst>
   <p:defaultTextStyle>
@@ -1162,7 +1161,7 @@
   <p:cSld>
     <p:spTree>
       <p:nvGrpSpPr>
-        <p:cNvPr id="1" name="Shape 60"/>
+        <p:cNvPr id="1" name="Shape 54"/>
         <p:cNvGrpSpPr/>
         <p:nvPr/>
       </p:nvGrpSpPr>
@@ -1176,7 +1175,7 @@
       </p:grpSpPr>
       <p:sp>
         <p:nvSpPr>
-          <p:cNvPr id="61" name="Google Shape;61;gd8e9b03fd4_0_20:notes"/>
+          <p:cNvPr id="55" name="Google Shape;55;gd8e9b03fd4_0_15:notes"/>
           <p:cNvSpPr>
             <a:spLocks noGrp="1" noRot="1" noChangeAspect="1"/>
           </p:cNvSpPr>
@@ -1217,7 +1216,7 @@
       </p:sp>
       <p:sp>
         <p:nvSpPr>
-          <p:cNvPr id="62" name="Google Shape;62;gd8e9b03fd4_0_20:notes"/>
+          <p:cNvPr id="56" name="Google Shape;56;gd8e9b03fd4_0_15:notes"/>
           <p:cNvSpPr txBox="1">
             <a:spLocks noGrp="1"/>
           </p:cNvSpPr>
@@ -1251,7 +1250,7 @@
             </a:pPr>
             <a:r>
               <a:rPr lang="pt-BR"/>
-              <a:t>Objetivo: explicar e/ou ilustrar pontos importantes para a audiência.</a:t>
+              <a:t>Objetivo: informar à audiência o que é necessário para melhor aproveitamento do conteúdo.</a:t>
             </a:r>
             <a:endParaRPr/>
           </a:p>
@@ -1366,6 +1365,11 @@
         </p:txBody>
       </p:sp>
     </p:spTree>
+    <p:extLst>
+      <p:ext uri="{BB962C8B-B14F-4D97-AF65-F5344CB8AC3E}">
+        <p14:creationId xmlns:p14="http://schemas.microsoft.com/office/powerpoint/2010/main" val="1545179741"/>
+      </p:ext>
+    </p:extLst>
   </p:cSld>
   <p:clrMapOvr>
     <a:masterClrMapping/>
@@ -1476,7 +1480,7 @@
     </p:spTree>
     <p:extLst>
       <p:ext uri="{BB962C8B-B14F-4D97-AF65-F5344CB8AC3E}">
-        <p14:creationId xmlns:p14="http://schemas.microsoft.com/office/powerpoint/2010/main" val="1545179741"/>
+        <p14:creationId xmlns:p14="http://schemas.microsoft.com/office/powerpoint/2010/main" val="729362283"/>
       </p:ext>
     </p:extLst>
   </p:cSld>
@@ -1487,119 +1491,6 @@
 </file>
 
 <file path=ppt/notesSlides/notesSlide8.xml><?xml version="1.0" encoding="utf-8"?>
-<p:notes xmlns:a="http://schemas.openxmlformats.org/drawingml/2006/main" xmlns:r="http://schemas.openxmlformats.org/officeDocument/2006/relationships" xmlns:p="http://schemas.openxmlformats.org/presentationml/2006/main" showMasterSp="0" showMasterPhAnim="0">
-  <p:cSld>
-    <p:spTree>
-      <p:nvGrpSpPr>
-        <p:cNvPr id="1" name="Shape 54"/>
-        <p:cNvGrpSpPr/>
-        <p:nvPr/>
-      </p:nvGrpSpPr>
-      <p:grpSpPr>
-        <a:xfrm>
-          <a:off x="0" y="0"/>
-          <a:ext cx="0" cy="0"/>
-          <a:chOff x="0" y="0"/>
-          <a:chExt cx="0" cy="0"/>
-        </a:xfrm>
-      </p:grpSpPr>
-      <p:sp>
-        <p:nvSpPr>
-          <p:cNvPr id="55" name="Google Shape;55;gd8e9b03fd4_0_15:notes"/>
-          <p:cNvSpPr>
-            <a:spLocks noGrp="1" noRot="1" noChangeAspect="1"/>
-          </p:cNvSpPr>
-          <p:nvPr>
-            <p:ph type="sldImg" idx="2"/>
-          </p:nvPr>
-        </p:nvSpPr>
-        <p:spPr>
-          <a:xfrm>
-            <a:off x="381000" y="685800"/>
-            <a:ext cx="6096000" cy="3429000"/>
-          </a:xfrm>
-          <a:custGeom>
-            <a:avLst/>
-            <a:gdLst/>
-            <a:ahLst/>
-            <a:cxnLst/>
-            <a:rect l="l" t="t" r="r" b="b"/>
-            <a:pathLst>
-              <a:path w="120000" h="120000" extrusionOk="0">
-                <a:moveTo>
-                  <a:pt x="0" y="0"/>
-                </a:moveTo>
-                <a:lnTo>
-                  <a:pt x="120000" y="0"/>
-                </a:lnTo>
-                <a:lnTo>
-                  <a:pt x="120000" y="120000"/>
-                </a:lnTo>
-                <a:lnTo>
-                  <a:pt x="0" y="120000"/>
-                </a:lnTo>
-                <a:close/>
-              </a:path>
-            </a:pathLst>
-          </a:custGeom>
-        </p:spPr>
-      </p:sp>
-      <p:sp>
-        <p:nvSpPr>
-          <p:cNvPr id="56" name="Google Shape;56;gd8e9b03fd4_0_15:notes"/>
-          <p:cNvSpPr txBox="1">
-            <a:spLocks noGrp="1"/>
-          </p:cNvSpPr>
-          <p:nvPr>
-            <p:ph type="body" idx="1"/>
-          </p:nvPr>
-        </p:nvSpPr>
-        <p:spPr>
-          <a:xfrm>
-            <a:off x="685800" y="4343400"/>
-            <a:ext cx="5486400" cy="4114800"/>
-          </a:xfrm>
-          <a:prstGeom prst="rect">
-            <a:avLst/>
-          </a:prstGeom>
-        </p:spPr>
-        <p:txBody>
-          <a:bodyPr spcFirstLastPara="1" wrap="square" lIns="91425" tIns="91425" rIns="91425" bIns="91425" anchor="t" anchorCtr="0">
-            <a:noAutofit/>
-          </a:bodyPr>
-          <a:lstStyle/>
-          <a:p>
-            <a:pPr marL="0" lvl="0" indent="0" algn="l" rtl="0">
-              <a:spcBef>
-                <a:spcPts val="0"/>
-              </a:spcBef>
-              <a:spcAft>
-                <a:spcPts val="0"/>
-              </a:spcAft>
-              <a:buNone/>
-            </a:pPr>
-            <a:r>
-              <a:rPr lang="pt-BR"/>
-              <a:t>Objetivo: informar à audiência o que é necessário para melhor aproveitamento do conteúdo.</a:t>
-            </a:r>
-            <a:endParaRPr/>
-          </a:p>
-        </p:txBody>
-      </p:sp>
-    </p:spTree>
-    <p:extLst>
-      <p:ext uri="{BB962C8B-B14F-4D97-AF65-F5344CB8AC3E}">
-        <p14:creationId xmlns:p14="http://schemas.microsoft.com/office/powerpoint/2010/main" val="729362283"/>
-      </p:ext>
-    </p:extLst>
-  </p:cSld>
-  <p:clrMapOvr>
-    <a:masterClrMapping/>
-  </p:clrMapOvr>
-</p:notes>
-</file>
-
-<file path=ppt/notesSlides/notesSlide9.xml><?xml version="1.0" encoding="utf-8"?>
 <p:notes xmlns:a="http://schemas.openxmlformats.org/drawingml/2006/main" xmlns:r="http://schemas.openxmlformats.org/officeDocument/2006/relationships" xmlns:p="http://schemas.openxmlformats.org/presentationml/2006/main" showMasterSp="0" showMasterPhAnim="0">
   <p:cSld>
     <p:spTree>
@@ -4289,10 +4180,10 @@
               <a:buNone/>
             </a:pPr>
             <a:r>
-              <a:rPr lang="pt-BR"/>
-              <a:t>13/05/2021</a:t>
-            </a:r>
-            <a:endParaRPr/>
+              <a:rPr lang="pt-BR" dirty="0"/>
+              <a:t>05/06/2021</a:t>
+            </a:r>
+            <a:endParaRPr dirty="0"/>
           </a:p>
         </p:txBody>
       </p:sp>
@@ -5048,13 +4939,30 @@
             </a:r>
             <a:r>
               <a:rPr lang="pt-BR" dirty="0"/>
-              <a:t> e muito </a:t>
-            </a:r>
-            <a:r>
-              <a:rPr lang="pt-BR"/>
-              <a:t>mais;</a:t>
-            </a:r>
-            <a:endParaRPr lang="pt-BR" dirty="0"/>
+              <a:t> e muito mais;</a:t>
+            </a:r>
+          </a:p>
+          <a:p>
+            <a:pPr>
+              <a:lnSpc>
+                <a:spcPct val="150000"/>
+              </a:lnSpc>
+            </a:pPr>
+            <a:r>
+              <a:rPr lang="pt-BR" dirty="0"/>
+              <a:t>Repositório do projeto no GitHub</a:t>
+            </a:r>
+          </a:p>
+          <a:p>
+            <a:pPr lvl="1">
+              <a:lnSpc>
+                <a:spcPct val="150000"/>
+              </a:lnSpc>
+            </a:pPr>
+            <a:r>
+              <a:rPr lang="pt-BR" dirty="0"/>
+              <a:t>https://github.com/rocketseat-experts-club/spring-boot-actuator-2021-06-05</a:t>
+            </a:r>
           </a:p>
         </p:txBody>
       </p:sp>
@@ -5071,7 +4979,7 @@
   <p:cSld>
     <p:spTree>
       <p:nvGrpSpPr>
-        <p:cNvPr id="1" name="Shape 63"/>
+        <p:cNvPr id="1" name="Shape 57"/>
         <p:cNvGrpSpPr/>
         <p:nvPr/>
       </p:nvGrpSpPr>
@@ -5085,7 +4993,7 @@
       </p:grpSpPr>
       <p:sp>
         <p:nvSpPr>
-          <p:cNvPr id="64" name="Google Shape;64;p11"/>
+          <p:cNvPr id="58" name="Google Shape;58;p10"/>
           <p:cNvSpPr txBox="1">
             <a:spLocks noGrp="1"/>
           </p:cNvSpPr>
@@ -5108,24 +5016,30 @@
           </a:bodyPr>
           <a:lstStyle/>
           <a:p>
+            <a:pPr marL="0" lvl="0" indent="0" algn="l" rtl="0">
+              <a:spcBef>
+                <a:spcPts val="0"/>
+              </a:spcBef>
+              <a:spcAft>
+                <a:spcPts val="0"/>
+              </a:spcAft>
+              <a:buNone/>
+            </a:pPr>
             <a:r>
               <a:rPr lang="pt-BR" dirty="0"/>
-              <a:t>Demo de como usar a </a:t>
+              <a:t>Spring Boot </a:t>
             </a:r>
             <a:r>
               <a:rPr lang="pt-BR" dirty="0" err="1"/>
-              <a:t>Stream</a:t>
-            </a:r>
-            <a:r>
-              <a:rPr lang="pt-BR" dirty="0"/>
-              <a:t> API</a:t>
-            </a:r>
+              <a:t>Actuator</a:t>
+            </a:r>
+            <a:endParaRPr dirty="0"/>
           </a:p>
         </p:txBody>
       </p:sp>
       <p:sp>
         <p:nvSpPr>
-          <p:cNvPr id="65" name="Google Shape;65;p11"/>
+          <p:cNvPr id="59" name="Google Shape;59;p10"/>
           <p:cNvSpPr txBox="1">
             <a:spLocks noGrp="1"/>
           </p:cNvSpPr>
@@ -5135,20 +5049,20 @@
         </p:nvSpPr>
         <p:spPr>
           <a:xfrm>
-            <a:off x="420309" y="919351"/>
-            <a:ext cx="8303382" cy="1080271"/>
+            <a:off x="311700" y="1000075"/>
+            <a:ext cx="8520600" cy="3416400"/>
           </a:xfrm>
           <a:prstGeom prst="rect">
             <a:avLst/>
           </a:prstGeom>
         </p:spPr>
         <p:txBody>
-          <a:bodyPr spcFirstLastPara="1" wrap="square" lIns="91425" tIns="91425" rIns="91425" bIns="91425" anchor="ctr" anchorCtr="0">
-            <a:noAutofit/>
+          <a:bodyPr spcFirstLastPara="1" wrap="square" lIns="91425" tIns="91425" rIns="91425" bIns="91425" anchor="t" anchorCtr="0">
+            <a:normAutofit/>
           </a:bodyPr>
           <a:lstStyle/>
           <a:p>
-            <a:pPr marL="0" lvl="0" indent="0" algn="just" rtl="0">
+            <a:pPr marL="457200" lvl="0" indent="-342900" algn="l" rtl="0">
               <a:lnSpc>
                 <a:spcPct val="150000"/>
               </a:lnSpc>
@@ -5156,116 +5070,106 @@
                 <a:spcPts val="0"/>
               </a:spcBef>
               <a:spcAft>
-                <a:spcPts val="1200"/>
-              </a:spcAft>
-              <a:buNone/>
+                <a:spcPts val="0"/>
+              </a:spcAft>
+              <a:buSzPts val="1800"/>
+              <a:buChar char="●"/>
             </a:pPr>
             <a:r>
               <a:rPr lang="pt-BR" dirty="0"/>
-              <a:t>A partir da lista abaixo, chamada de </a:t>
+              <a:t>O que é o Spring </a:t>
             </a:r>
             <a:r>
               <a:rPr lang="pt-BR" dirty="0" err="1"/>
-              <a:t>numbers</a:t>
+              <a:t>Actuator</a:t>
             </a:r>
             <a:r>
               <a:rPr lang="pt-BR" dirty="0"/>
-              <a:t>, calcule a soma dos números que não se repetem.</a:t>
+              <a:t>?</a:t>
             </a:r>
             <a:endParaRPr dirty="0"/>
+          </a:p>
+          <a:p>
+            <a:pPr marL="914400" lvl="1" indent="-317500" algn="l" rtl="0">
+              <a:lnSpc>
+                <a:spcPct val="150000"/>
+              </a:lnSpc>
+              <a:spcBef>
+                <a:spcPts val="0"/>
+              </a:spcBef>
+              <a:spcAft>
+                <a:spcPts val="0"/>
+              </a:spcAft>
+              <a:buSzPts val="1400"/>
+              <a:buChar char="○"/>
+            </a:pPr>
+            <a:r>
+              <a:rPr lang="pt-BR" dirty="0"/>
+              <a:t>É um subprojeto do Spring Framework com o objetivo de monitorar a aplicação, coletar métricas, entender o tráfico ou o estado de nosso sistema.</a:t>
+            </a:r>
+          </a:p>
+          <a:p>
+            <a:pPr marL="914400" lvl="1" indent="-317500" algn="l" rtl="0">
+              <a:lnSpc>
+                <a:spcPct val="150000"/>
+              </a:lnSpc>
+              <a:spcBef>
+                <a:spcPts val="0"/>
+              </a:spcBef>
+              <a:spcAft>
+                <a:spcPts val="0"/>
+              </a:spcAft>
+              <a:buSzPts val="1400"/>
+              <a:buChar char="○"/>
+            </a:pPr>
+            <a:r>
+              <a:rPr lang="pt-BR" dirty="0"/>
+              <a:t>Utilizado principalmente para expor informações operacionais sobre a aplicação em execução. Como por exemplo:</a:t>
+            </a:r>
+          </a:p>
+          <a:p>
+            <a:pPr lvl="2">
+              <a:lnSpc>
+                <a:spcPct val="150000"/>
+              </a:lnSpc>
+              <a:buChar char="○"/>
+            </a:pPr>
+            <a:r>
+              <a:rPr lang="pt-BR" dirty="0" err="1"/>
+              <a:t>health</a:t>
+            </a:r>
+            <a:r>
+              <a:rPr lang="pt-BR" dirty="0"/>
+              <a:t>, </a:t>
+            </a:r>
+            <a:r>
+              <a:rPr lang="pt-BR" dirty="0" err="1"/>
+              <a:t>metrics</a:t>
+            </a:r>
+            <a:r>
+              <a:rPr lang="pt-BR" dirty="0"/>
+              <a:t>, </a:t>
+            </a:r>
+            <a:r>
+              <a:rPr lang="pt-BR" dirty="0" err="1"/>
+              <a:t>info</a:t>
+            </a:r>
+            <a:r>
+              <a:rPr lang="pt-BR" dirty="0"/>
+              <a:t>, etc...</a:t>
+            </a:r>
+          </a:p>
+          <a:p>
+            <a:pPr lvl="2">
+              <a:lnSpc>
+                <a:spcPct val="150000"/>
+              </a:lnSpc>
+              <a:buChar char="○"/>
+            </a:pPr>
+            <a:endParaRPr lang="pt-BR" dirty="0"/>
           </a:p>
         </p:txBody>
       </p:sp>
-      <p:pic>
-        <p:nvPicPr>
-          <p:cNvPr id="3" name="Imagem 2">
-            <a:extLst>
-              <a:ext uri="{FF2B5EF4-FFF2-40B4-BE49-F238E27FC236}">
-                <a16:creationId xmlns:a16="http://schemas.microsoft.com/office/drawing/2014/main" id="{656B7DC7-05E0-4718-B890-0BE3810C922A}"/>
-              </a:ext>
-            </a:extLst>
-          </p:cNvPr>
-          <p:cNvPicPr>
-            <a:picLocks noChangeAspect="1"/>
-          </p:cNvPicPr>
-          <p:nvPr/>
-        </p:nvPicPr>
-        <p:blipFill>
-          <a:blip r:embed="rId3"/>
-          <a:stretch>
-            <a:fillRect/>
-          </a:stretch>
-        </p:blipFill>
-        <p:spPr>
-          <a:xfrm>
-            <a:off x="757062" y="2749599"/>
-            <a:ext cx="3087501" cy="1323215"/>
-          </a:xfrm>
-          <a:prstGeom prst="rect">
-            <a:avLst/>
-          </a:prstGeom>
-        </p:spPr>
-      </p:pic>
-      <p:pic>
-        <p:nvPicPr>
-          <p:cNvPr id="5" name="Imagem 4">
-            <a:extLst>
-              <a:ext uri="{FF2B5EF4-FFF2-40B4-BE49-F238E27FC236}">
-                <a16:creationId xmlns:a16="http://schemas.microsoft.com/office/drawing/2014/main" id="{3078B00F-EAA5-402F-AB0B-CCF7D5C06CC3}"/>
-              </a:ext>
-            </a:extLst>
-          </p:cNvPr>
-          <p:cNvPicPr>
-            <a:picLocks noChangeAspect="1"/>
-          </p:cNvPicPr>
-          <p:nvPr/>
-        </p:nvPicPr>
-        <p:blipFill>
-          <a:blip r:embed="rId4"/>
-          <a:stretch>
-            <a:fillRect/>
-          </a:stretch>
-        </p:blipFill>
-        <p:spPr>
-          <a:xfrm>
-            <a:off x="4199426" y="2958768"/>
-            <a:ext cx="2819400" cy="904875"/>
-          </a:xfrm>
-          <a:prstGeom prst="rect">
-            <a:avLst/>
-          </a:prstGeom>
-        </p:spPr>
-      </p:pic>
-      <p:pic>
-        <p:nvPicPr>
-          <p:cNvPr id="4" name="Imagem 3">
-            <a:extLst>
-              <a:ext uri="{FF2B5EF4-FFF2-40B4-BE49-F238E27FC236}">
-                <a16:creationId xmlns:a16="http://schemas.microsoft.com/office/drawing/2014/main" id="{FF01BE43-602A-4DC9-ABD3-C487ADA577EE}"/>
-              </a:ext>
-            </a:extLst>
-          </p:cNvPr>
-          <p:cNvPicPr>
-            <a:picLocks noChangeAspect="1"/>
-          </p:cNvPicPr>
-          <p:nvPr/>
-        </p:nvPicPr>
-        <p:blipFill>
-          <a:blip r:embed="rId5"/>
-          <a:stretch>
-            <a:fillRect/>
-          </a:stretch>
-        </p:blipFill>
-        <p:spPr>
-          <a:xfrm>
-            <a:off x="495590" y="1979718"/>
-            <a:ext cx="3610446" cy="514664"/>
-          </a:xfrm>
-          <a:prstGeom prst="rect">
-            <a:avLst/>
-          </a:prstGeom>
-        </p:spPr>
-      </p:pic>
     </p:spTree>
   </p:cSld>
   <p:clrMapOvr>
@@ -5349,8 +5253,8 @@
         </p:nvSpPr>
         <p:spPr>
           <a:xfrm>
-            <a:off x="311700" y="1000075"/>
-            <a:ext cx="8520600" cy="3416400"/>
+            <a:off x="311700" y="865325"/>
+            <a:ext cx="6405106" cy="4029125"/>
           </a:xfrm>
           <a:prstGeom prst="rect">
             <a:avLst/>
@@ -5377,15 +5281,15 @@
             </a:pPr>
             <a:r>
               <a:rPr lang="pt-BR" dirty="0"/>
-              <a:t>O que é o Spring </a:t>
+              <a:t>Alguns dos </a:t>
             </a:r>
             <a:r>
               <a:rPr lang="pt-BR" dirty="0" err="1"/>
-              <a:t>Actuator</a:t>
+              <a:t>endpoints</a:t>
             </a:r>
             <a:r>
               <a:rPr lang="pt-BR" dirty="0"/>
-              <a:t>?</a:t>
+              <a:t> mais utilizados:</a:t>
             </a:r>
             <a:endParaRPr dirty="0"/>
           </a:p>
@@ -5404,9 +5308,23 @@
               <a:buChar char="○"/>
             </a:pPr>
             <a:r>
-              <a:rPr lang="pt-BR" dirty="0"/>
-              <a:t>É um subprojeto do Spring Framework com o objetivo de monitorar a aplicação, coletar métricas, entender o tráfico ou o estado de nosso sistema.</a:t>
-            </a:r>
+              <a:rPr lang="pt-BR" dirty="0" err="1">
+                <a:latin typeface="Roboto" panose="02000000000000000000" pitchFamily="2" charset="0"/>
+                <a:ea typeface="Roboto" panose="02000000000000000000" pitchFamily="2" charset="0"/>
+              </a:rPr>
+              <a:t>Actuator</a:t>
+            </a:r>
+            <a:r>
+              <a:rPr lang="pt-BR" dirty="0">
+                <a:latin typeface="Roboto" panose="02000000000000000000" pitchFamily="2" charset="0"/>
+                <a:ea typeface="Roboto" panose="02000000000000000000" pitchFamily="2" charset="0"/>
+              </a:rPr>
+              <a:t>;</a:t>
+            </a:r>
+            <a:endParaRPr dirty="0">
+              <a:latin typeface="Roboto" panose="02000000000000000000" pitchFamily="2" charset="0"/>
+              <a:ea typeface="Roboto" panose="02000000000000000000" pitchFamily="2" charset="0"/>
+            </a:endParaRPr>
           </a:p>
           <a:p>
             <a:pPr marL="914400" lvl="1" indent="-317500" algn="l" rtl="0">
@@ -5423,54 +5341,232 @@
               <a:buChar char="○"/>
             </a:pPr>
             <a:r>
-              <a:rPr lang="pt-BR" dirty="0"/>
-              <a:t>Utilizado principalmente para expor informações operacionais sobre a aplicação em execução. Como por exemplo:</a:t>
-            </a:r>
-          </a:p>
-          <a:p>
-            <a:pPr lvl="2">
+              <a:rPr lang="pt-BR" dirty="0">
+                <a:latin typeface="Roboto" panose="02000000000000000000" pitchFamily="2" charset="0"/>
+                <a:ea typeface="Roboto" panose="02000000000000000000" pitchFamily="2" charset="0"/>
+              </a:rPr>
+              <a:t>Info;</a:t>
+            </a:r>
+          </a:p>
+          <a:p>
+            <a:pPr marL="914400" lvl="1" indent="-317500" algn="l" rtl="0">
               <a:lnSpc>
                 <a:spcPct val="150000"/>
               </a:lnSpc>
+              <a:spcBef>
+                <a:spcPts val="0"/>
+              </a:spcBef>
+              <a:spcAft>
+                <a:spcPts val="0"/>
+              </a:spcAft>
+              <a:buSzPts val="1400"/>
               <a:buChar char="○"/>
             </a:pPr>
             <a:r>
-              <a:rPr lang="pt-BR" dirty="0" err="1"/>
-              <a:t>health</a:t>
-            </a:r>
-            <a:r>
-              <a:rPr lang="pt-BR" dirty="0"/>
-              <a:t>, </a:t>
-            </a:r>
-            <a:r>
-              <a:rPr lang="pt-BR" dirty="0" err="1"/>
-              <a:t>metrics</a:t>
-            </a:r>
-            <a:r>
-              <a:rPr lang="pt-BR" dirty="0"/>
-              <a:t>, </a:t>
-            </a:r>
-            <a:r>
-              <a:rPr lang="pt-BR" dirty="0" err="1"/>
-              <a:t>info</a:t>
-            </a:r>
-            <a:r>
-              <a:rPr lang="pt-BR" dirty="0"/>
-              <a:t>, etc...</a:t>
-            </a:r>
-          </a:p>
-          <a:p>
-            <a:pPr lvl="2">
+              <a:rPr lang="pt-BR" dirty="0">
+                <a:latin typeface="Roboto" panose="02000000000000000000" pitchFamily="2" charset="0"/>
+                <a:ea typeface="Roboto" panose="02000000000000000000" pitchFamily="2" charset="0"/>
+              </a:rPr>
+              <a:t>Health;</a:t>
+            </a:r>
+          </a:p>
+          <a:p>
+            <a:pPr marL="914400" lvl="1" indent="-317500" algn="l" rtl="0">
               <a:lnSpc>
                 <a:spcPct val="150000"/>
               </a:lnSpc>
+              <a:spcBef>
+                <a:spcPts val="0"/>
+              </a:spcBef>
+              <a:spcAft>
+                <a:spcPts val="0"/>
+              </a:spcAft>
+              <a:buSzPts val="1400"/>
               <a:buChar char="○"/>
             </a:pPr>
-            <a:endParaRPr lang="pt-BR" dirty="0"/>
+            <a:r>
+              <a:rPr lang="pt-BR" dirty="0" err="1">
+                <a:latin typeface="Roboto" panose="02000000000000000000" pitchFamily="2" charset="0"/>
+                <a:ea typeface="Roboto" panose="02000000000000000000" pitchFamily="2" charset="0"/>
+              </a:rPr>
+              <a:t>Metrics</a:t>
+            </a:r>
+            <a:r>
+              <a:rPr lang="pt-BR" dirty="0">
+                <a:latin typeface="Roboto" panose="02000000000000000000" pitchFamily="2" charset="0"/>
+                <a:ea typeface="Roboto" panose="02000000000000000000" pitchFamily="2" charset="0"/>
+              </a:rPr>
+              <a:t>;</a:t>
+            </a:r>
+          </a:p>
+          <a:p>
+            <a:pPr marL="914400" lvl="1" indent="-317500" algn="l" rtl="0">
+              <a:lnSpc>
+                <a:spcPct val="150000"/>
+              </a:lnSpc>
+              <a:spcBef>
+                <a:spcPts val="0"/>
+              </a:spcBef>
+              <a:spcAft>
+                <a:spcPts val="0"/>
+              </a:spcAft>
+              <a:buSzPts val="1400"/>
+              <a:buChar char="○"/>
+            </a:pPr>
+            <a:r>
+              <a:rPr lang="pt-BR" dirty="0">
+                <a:latin typeface="Roboto" panose="02000000000000000000" pitchFamily="2" charset="0"/>
+                <a:ea typeface="Roboto" panose="02000000000000000000" pitchFamily="2" charset="0"/>
+              </a:rPr>
+              <a:t>Mappings;</a:t>
+            </a:r>
+          </a:p>
+          <a:p>
+            <a:pPr marL="914400" lvl="1" indent="-317500" algn="l" rtl="0">
+              <a:lnSpc>
+                <a:spcPct val="150000"/>
+              </a:lnSpc>
+              <a:spcBef>
+                <a:spcPts val="0"/>
+              </a:spcBef>
+              <a:spcAft>
+                <a:spcPts val="0"/>
+              </a:spcAft>
+              <a:buSzPts val="1400"/>
+              <a:buChar char="○"/>
+            </a:pPr>
+            <a:r>
+              <a:rPr lang="pt-BR" dirty="0" err="1">
+                <a:latin typeface="Roboto" panose="02000000000000000000" pitchFamily="2" charset="0"/>
+                <a:ea typeface="Roboto" panose="02000000000000000000" pitchFamily="2" charset="0"/>
+              </a:rPr>
+              <a:t>Httptrace</a:t>
+            </a:r>
+            <a:r>
+              <a:rPr lang="pt-BR" dirty="0">
+                <a:latin typeface="Roboto" panose="02000000000000000000" pitchFamily="2" charset="0"/>
+                <a:ea typeface="Roboto" panose="02000000000000000000" pitchFamily="2" charset="0"/>
+              </a:rPr>
+              <a:t>;</a:t>
+            </a:r>
+          </a:p>
+          <a:p>
+            <a:pPr marL="914400" lvl="1" indent="-317500" algn="l" rtl="0">
+              <a:lnSpc>
+                <a:spcPct val="150000"/>
+              </a:lnSpc>
+              <a:spcBef>
+                <a:spcPts val="0"/>
+              </a:spcBef>
+              <a:spcAft>
+                <a:spcPts val="0"/>
+              </a:spcAft>
+              <a:buSzPts val="1400"/>
+              <a:buChar char="○"/>
+            </a:pPr>
+            <a:r>
+              <a:rPr lang="pt-BR" dirty="0" err="1">
+                <a:latin typeface="Roboto" panose="02000000000000000000" pitchFamily="2" charset="0"/>
+                <a:ea typeface="Roboto" panose="02000000000000000000" pitchFamily="2" charset="0"/>
+              </a:rPr>
+              <a:t>Auditevents</a:t>
+            </a:r>
+            <a:r>
+              <a:rPr lang="pt-BR" dirty="0">
+                <a:latin typeface="Roboto" panose="02000000000000000000" pitchFamily="2" charset="0"/>
+                <a:ea typeface="Roboto" panose="02000000000000000000" pitchFamily="2" charset="0"/>
+              </a:rPr>
+              <a:t>;</a:t>
+            </a:r>
+          </a:p>
+          <a:p>
+            <a:pPr marL="914400" lvl="1" indent="-317500" algn="l" rtl="0">
+              <a:lnSpc>
+                <a:spcPct val="150000"/>
+              </a:lnSpc>
+              <a:spcBef>
+                <a:spcPts val="0"/>
+              </a:spcBef>
+              <a:spcAft>
+                <a:spcPts val="0"/>
+              </a:spcAft>
+              <a:buSzPts val="1400"/>
+              <a:buChar char="○"/>
+            </a:pPr>
+            <a:r>
+              <a:rPr lang="pt-BR" dirty="0" err="1">
+                <a:latin typeface="Roboto" panose="02000000000000000000" pitchFamily="2" charset="0"/>
+                <a:ea typeface="Roboto" panose="02000000000000000000" pitchFamily="2" charset="0"/>
+              </a:rPr>
+              <a:t>Env</a:t>
+            </a:r>
+            <a:r>
+              <a:rPr lang="pt-BR" dirty="0">
+                <a:latin typeface="Roboto" panose="02000000000000000000" pitchFamily="2" charset="0"/>
+                <a:ea typeface="Roboto" panose="02000000000000000000" pitchFamily="2" charset="0"/>
+              </a:rPr>
+              <a:t>;</a:t>
+            </a:r>
+          </a:p>
+          <a:p>
+            <a:pPr marL="914400" lvl="1" indent="-317500" algn="l" rtl="0">
+              <a:lnSpc>
+                <a:spcPct val="150000"/>
+              </a:lnSpc>
+              <a:spcBef>
+                <a:spcPts val="0"/>
+              </a:spcBef>
+              <a:spcAft>
+                <a:spcPts val="0"/>
+              </a:spcAft>
+              <a:buSzPts val="1400"/>
+              <a:buChar char="○"/>
+            </a:pPr>
+            <a:r>
+              <a:rPr lang="pt-BR" dirty="0" err="1">
+                <a:latin typeface="Roboto" panose="02000000000000000000" pitchFamily="2" charset="0"/>
+                <a:ea typeface="Roboto" panose="02000000000000000000" pitchFamily="2" charset="0"/>
+              </a:rPr>
+              <a:t>Scheduledtasks</a:t>
+            </a:r>
+            <a:r>
+              <a:rPr lang="pt-BR" dirty="0">
+                <a:latin typeface="Roboto" panose="02000000000000000000" pitchFamily="2" charset="0"/>
+                <a:ea typeface="Roboto" panose="02000000000000000000" pitchFamily="2" charset="0"/>
+              </a:rPr>
+              <a:t>;</a:t>
+            </a:r>
+          </a:p>
+          <a:p>
+            <a:pPr marL="914400" lvl="1" indent="-317500" algn="l" rtl="0">
+              <a:lnSpc>
+                <a:spcPct val="150000"/>
+              </a:lnSpc>
+              <a:spcBef>
+                <a:spcPts val="0"/>
+              </a:spcBef>
+              <a:spcAft>
+                <a:spcPts val="0"/>
+              </a:spcAft>
+              <a:buSzPts val="1400"/>
+              <a:buChar char="○"/>
+            </a:pPr>
+            <a:r>
+              <a:rPr lang="pt-BR" dirty="0">
+                <a:latin typeface="Roboto" panose="02000000000000000000" pitchFamily="2" charset="0"/>
+                <a:ea typeface="Roboto" panose="02000000000000000000" pitchFamily="2" charset="0"/>
+              </a:rPr>
+              <a:t>Caches;</a:t>
+            </a:r>
           </a:p>
         </p:txBody>
       </p:sp>
     </p:spTree>
+    <p:extLst>
+      <p:ext uri="{BB962C8B-B14F-4D97-AF65-F5344CB8AC3E}">
+        <p14:creationId xmlns:p14="http://schemas.microsoft.com/office/powerpoint/2010/main" val="138095429"/>
+      </p:ext>
+    </p:extLst>
   </p:cSld>
   <p:clrMapOvr>
     <a:masterClrMapping/>
@@ -5530,402 +5626,6 @@
               <a:buNone/>
             </a:pPr>
             <a:r>
-              <a:rPr lang="pt-BR" dirty="0"/>
-              <a:t>Spring Boot </a:t>
-            </a:r>
-            <a:r>
-              <a:rPr lang="pt-BR" dirty="0" err="1"/>
-              <a:t>Actuator</a:t>
-            </a:r>
-            <a:endParaRPr dirty="0"/>
-          </a:p>
-        </p:txBody>
-      </p:sp>
-      <p:sp>
-        <p:nvSpPr>
-          <p:cNvPr id="59" name="Google Shape;59;p10"/>
-          <p:cNvSpPr txBox="1">
-            <a:spLocks noGrp="1"/>
-          </p:cNvSpPr>
-          <p:nvPr>
-            <p:ph type="body" idx="1"/>
-          </p:nvPr>
-        </p:nvSpPr>
-        <p:spPr>
-          <a:xfrm>
-            <a:off x="311700" y="865325"/>
-            <a:ext cx="6405106" cy="4029125"/>
-          </a:xfrm>
-          <a:prstGeom prst="rect">
-            <a:avLst/>
-          </a:prstGeom>
-        </p:spPr>
-        <p:txBody>
-          <a:bodyPr spcFirstLastPara="1" wrap="square" lIns="91425" tIns="91425" rIns="91425" bIns="91425" anchor="t" anchorCtr="0">
-            <a:normAutofit/>
-          </a:bodyPr>
-          <a:lstStyle/>
-          <a:p>
-            <a:pPr marL="457200" lvl="0" indent="-342900" algn="l" rtl="0">
-              <a:lnSpc>
-                <a:spcPct val="150000"/>
-              </a:lnSpc>
-              <a:spcBef>
-                <a:spcPts val="0"/>
-              </a:spcBef>
-              <a:spcAft>
-                <a:spcPts val="0"/>
-              </a:spcAft>
-              <a:buSzPts val="1800"/>
-              <a:buChar char="●"/>
-            </a:pPr>
-            <a:r>
-              <a:rPr lang="pt-BR" dirty="0"/>
-              <a:t>Alguns dos </a:t>
-            </a:r>
-            <a:r>
-              <a:rPr lang="pt-BR" dirty="0" err="1"/>
-              <a:t>endpoints</a:t>
-            </a:r>
-            <a:r>
-              <a:rPr lang="pt-BR" dirty="0"/>
-              <a:t> mais utilizados:</a:t>
-            </a:r>
-            <a:endParaRPr dirty="0"/>
-          </a:p>
-          <a:p>
-            <a:pPr marL="914400" lvl="1" indent="-317500" algn="l" rtl="0">
-              <a:lnSpc>
-                <a:spcPct val="150000"/>
-              </a:lnSpc>
-              <a:spcBef>
-                <a:spcPts val="0"/>
-              </a:spcBef>
-              <a:spcAft>
-                <a:spcPts val="0"/>
-              </a:spcAft>
-              <a:buSzPts val="1400"/>
-              <a:buChar char="○"/>
-            </a:pPr>
-            <a:r>
-              <a:rPr lang="pt-BR" dirty="0" err="1">
-                <a:latin typeface="Roboto" panose="02000000000000000000" pitchFamily="2" charset="0"/>
-                <a:ea typeface="Roboto" panose="02000000000000000000" pitchFamily="2" charset="0"/>
-              </a:rPr>
-              <a:t>Actuator</a:t>
-            </a:r>
-            <a:r>
-              <a:rPr lang="pt-BR" dirty="0">
-                <a:latin typeface="Roboto" panose="02000000000000000000" pitchFamily="2" charset="0"/>
-                <a:ea typeface="Roboto" panose="02000000000000000000" pitchFamily="2" charset="0"/>
-              </a:rPr>
-              <a:t>;</a:t>
-            </a:r>
-            <a:endParaRPr dirty="0">
-              <a:latin typeface="Roboto" panose="02000000000000000000" pitchFamily="2" charset="0"/>
-              <a:ea typeface="Roboto" panose="02000000000000000000" pitchFamily="2" charset="0"/>
-            </a:endParaRPr>
-          </a:p>
-          <a:p>
-            <a:pPr marL="914400" lvl="1" indent="-317500" algn="l" rtl="0">
-              <a:lnSpc>
-                <a:spcPct val="150000"/>
-              </a:lnSpc>
-              <a:spcBef>
-                <a:spcPts val="0"/>
-              </a:spcBef>
-              <a:spcAft>
-                <a:spcPts val="0"/>
-              </a:spcAft>
-              <a:buSzPts val="1400"/>
-              <a:buChar char="○"/>
-            </a:pPr>
-            <a:r>
-              <a:rPr lang="pt-BR" dirty="0">
-                <a:latin typeface="Roboto" panose="02000000000000000000" pitchFamily="2" charset="0"/>
-                <a:ea typeface="Roboto" panose="02000000000000000000" pitchFamily="2" charset="0"/>
-              </a:rPr>
-              <a:t>Info;</a:t>
-            </a:r>
-          </a:p>
-          <a:p>
-            <a:pPr marL="914400" lvl="1" indent="-317500" algn="l" rtl="0">
-              <a:lnSpc>
-                <a:spcPct val="150000"/>
-              </a:lnSpc>
-              <a:spcBef>
-                <a:spcPts val="0"/>
-              </a:spcBef>
-              <a:spcAft>
-                <a:spcPts val="0"/>
-              </a:spcAft>
-              <a:buSzPts val="1400"/>
-              <a:buChar char="○"/>
-            </a:pPr>
-            <a:r>
-              <a:rPr lang="pt-BR" dirty="0">
-                <a:latin typeface="Roboto" panose="02000000000000000000" pitchFamily="2" charset="0"/>
-                <a:ea typeface="Roboto" panose="02000000000000000000" pitchFamily="2" charset="0"/>
-              </a:rPr>
-              <a:t>Health;</a:t>
-            </a:r>
-          </a:p>
-          <a:p>
-            <a:pPr marL="914400" lvl="1" indent="-317500" algn="l" rtl="0">
-              <a:lnSpc>
-                <a:spcPct val="150000"/>
-              </a:lnSpc>
-              <a:spcBef>
-                <a:spcPts val="0"/>
-              </a:spcBef>
-              <a:spcAft>
-                <a:spcPts val="0"/>
-              </a:spcAft>
-              <a:buSzPts val="1400"/>
-              <a:buChar char="○"/>
-            </a:pPr>
-            <a:r>
-              <a:rPr lang="pt-BR" dirty="0" err="1">
-                <a:latin typeface="Roboto" panose="02000000000000000000" pitchFamily="2" charset="0"/>
-                <a:ea typeface="Roboto" panose="02000000000000000000" pitchFamily="2" charset="0"/>
-              </a:rPr>
-              <a:t>Metrics</a:t>
-            </a:r>
-            <a:r>
-              <a:rPr lang="pt-BR" dirty="0">
-                <a:latin typeface="Roboto" panose="02000000000000000000" pitchFamily="2" charset="0"/>
-                <a:ea typeface="Roboto" panose="02000000000000000000" pitchFamily="2" charset="0"/>
-              </a:rPr>
-              <a:t>;</a:t>
-            </a:r>
-          </a:p>
-          <a:p>
-            <a:pPr marL="914400" lvl="1" indent="-317500" algn="l" rtl="0">
-              <a:lnSpc>
-                <a:spcPct val="150000"/>
-              </a:lnSpc>
-              <a:spcBef>
-                <a:spcPts val="0"/>
-              </a:spcBef>
-              <a:spcAft>
-                <a:spcPts val="0"/>
-              </a:spcAft>
-              <a:buSzPts val="1400"/>
-              <a:buChar char="○"/>
-            </a:pPr>
-            <a:r>
-              <a:rPr lang="pt-BR" dirty="0">
-                <a:latin typeface="Roboto" panose="02000000000000000000" pitchFamily="2" charset="0"/>
-                <a:ea typeface="Roboto" panose="02000000000000000000" pitchFamily="2" charset="0"/>
-              </a:rPr>
-              <a:t>Mappings;</a:t>
-            </a:r>
-          </a:p>
-          <a:p>
-            <a:pPr marL="914400" lvl="1" indent="-317500" algn="l" rtl="0">
-              <a:lnSpc>
-                <a:spcPct val="150000"/>
-              </a:lnSpc>
-              <a:spcBef>
-                <a:spcPts val="0"/>
-              </a:spcBef>
-              <a:spcAft>
-                <a:spcPts val="0"/>
-              </a:spcAft>
-              <a:buSzPts val="1400"/>
-              <a:buChar char="○"/>
-            </a:pPr>
-            <a:r>
-              <a:rPr lang="pt-BR" dirty="0" err="1">
-                <a:latin typeface="Roboto" panose="02000000000000000000" pitchFamily="2" charset="0"/>
-                <a:ea typeface="Roboto" panose="02000000000000000000" pitchFamily="2" charset="0"/>
-              </a:rPr>
-              <a:t>Httptrace</a:t>
-            </a:r>
-            <a:r>
-              <a:rPr lang="pt-BR" dirty="0">
-                <a:latin typeface="Roboto" panose="02000000000000000000" pitchFamily="2" charset="0"/>
-                <a:ea typeface="Roboto" panose="02000000000000000000" pitchFamily="2" charset="0"/>
-              </a:rPr>
-              <a:t>;</a:t>
-            </a:r>
-          </a:p>
-          <a:p>
-            <a:pPr marL="914400" lvl="1" indent="-317500" algn="l" rtl="0">
-              <a:lnSpc>
-                <a:spcPct val="150000"/>
-              </a:lnSpc>
-              <a:spcBef>
-                <a:spcPts val="0"/>
-              </a:spcBef>
-              <a:spcAft>
-                <a:spcPts val="0"/>
-              </a:spcAft>
-              <a:buSzPts val="1400"/>
-              <a:buChar char="○"/>
-            </a:pPr>
-            <a:r>
-              <a:rPr lang="pt-BR" dirty="0" err="1">
-                <a:latin typeface="Roboto" panose="02000000000000000000" pitchFamily="2" charset="0"/>
-                <a:ea typeface="Roboto" panose="02000000000000000000" pitchFamily="2" charset="0"/>
-              </a:rPr>
-              <a:t>Auditevents</a:t>
-            </a:r>
-            <a:r>
-              <a:rPr lang="pt-BR" dirty="0">
-                <a:latin typeface="Roboto" panose="02000000000000000000" pitchFamily="2" charset="0"/>
-                <a:ea typeface="Roboto" panose="02000000000000000000" pitchFamily="2" charset="0"/>
-              </a:rPr>
-              <a:t>;</a:t>
-            </a:r>
-          </a:p>
-          <a:p>
-            <a:pPr marL="914400" lvl="1" indent="-317500" algn="l" rtl="0">
-              <a:lnSpc>
-                <a:spcPct val="150000"/>
-              </a:lnSpc>
-              <a:spcBef>
-                <a:spcPts val="0"/>
-              </a:spcBef>
-              <a:spcAft>
-                <a:spcPts val="0"/>
-              </a:spcAft>
-              <a:buSzPts val="1400"/>
-              <a:buChar char="○"/>
-            </a:pPr>
-            <a:r>
-              <a:rPr lang="pt-BR" dirty="0" err="1">
-                <a:latin typeface="Roboto" panose="02000000000000000000" pitchFamily="2" charset="0"/>
-                <a:ea typeface="Roboto" panose="02000000000000000000" pitchFamily="2" charset="0"/>
-              </a:rPr>
-              <a:t>Env</a:t>
-            </a:r>
-            <a:r>
-              <a:rPr lang="pt-BR" dirty="0">
-                <a:latin typeface="Roboto" panose="02000000000000000000" pitchFamily="2" charset="0"/>
-                <a:ea typeface="Roboto" panose="02000000000000000000" pitchFamily="2" charset="0"/>
-              </a:rPr>
-              <a:t>;</a:t>
-            </a:r>
-          </a:p>
-          <a:p>
-            <a:pPr marL="914400" lvl="1" indent="-317500" algn="l" rtl="0">
-              <a:lnSpc>
-                <a:spcPct val="150000"/>
-              </a:lnSpc>
-              <a:spcBef>
-                <a:spcPts val="0"/>
-              </a:spcBef>
-              <a:spcAft>
-                <a:spcPts val="0"/>
-              </a:spcAft>
-              <a:buSzPts val="1400"/>
-              <a:buChar char="○"/>
-            </a:pPr>
-            <a:r>
-              <a:rPr lang="pt-BR" dirty="0" err="1">
-                <a:latin typeface="Roboto" panose="02000000000000000000" pitchFamily="2" charset="0"/>
-                <a:ea typeface="Roboto" panose="02000000000000000000" pitchFamily="2" charset="0"/>
-              </a:rPr>
-              <a:t>Scheduledtasks</a:t>
-            </a:r>
-            <a:r>
-              <a:rPr lang="pt-BR" dirty="0">
-                <a:latin typeface="Roboto" panose="02000000000000000000" pitchFamily="2" charset="0"/>
-                <a:ea typeface="Roboto" panose="02000000000000000000" pitchFamily="2" charset="0"/>
-              </a:rPr>
-              <a:t>;</a:t>
-            </a:r>
-          </a:p>
-          <a:p>
-            <a:pPr marL="914400" lvl="1" indent="-317500" algn="l" rtl="0">
-              <a:lnSpc>
-                <a:spcPct val="150000"/>
-              </a:lnSpc>
-              <a:spcBef>
-                <a:spcPts val="0"/>
-              </a:spcBef>
-              <a:spcAft>
-                <a:spcPts val="0"/>
-              </a:spcAft>
-              <a:buSzPts val="1400"/>
-              <a:buChar char="○"/>
-            </a:pPr>
-            <a:r>
-              <a:rPr lang="pt-BR" dirty="0">
-                <a:latin typeface="Roboto" panose="02000000000000000000" pitchFamily="2" charset="0"/>
-                <a:ea typeface="Roboto" panose="02000000000000000000" pitchFamily="2" charset="0"/>
-              </a:rPr>
-              <a:t>Caches;</a:t>
-            </a:r>
-          </a:p>
-        </p:txBody>
-      </p:sp>
-    </p:spTree>
-    <p:extLst>
-      <p:ext uri="{BB962C8B-B14F-4D97-AF65-F5344CB8AC3E}">
-        <p14:creationId xmlns:p14="http://schemas.microsoft.com/office/powerpoint/2010/main" val="138095429"/>
-      </p:ext>
-    </p:extLst>
-  </p:cSld>
-  <p:clrMapOvr>
-    <a:masterClrMapping/>
-  </p:clrMapOvr>
-</p:sld>
-</file>
-
-<file path=ppt/slides/slide8.xml><?xml version="1.0" encoding="utf-8"?>
-<p:sld xmlns:a="http://schemas.openxmlformats.org/drawingml/2006/main" xmlns:r="http://schemas.openxmlformats.org/officeDocument/2006/relationships" xmlns:p="http://schemas.openxmlformats.org/presentationml/2006/main">
-  <p:cSld>
-    <p:spTree>
-      <p:nvGrpSpPr>
-        <p:cNvPr id="1" name="Shape 57"/>
-        <p:cNvGrpSpPr/>
-        <p:nvPr/>
-      </p:nvGrpSpPr>
-      <p:grpSpPr>
-        <a:xfrm>
-          <a:off x="0" y="0"/>
-          <a:ext cx="0" cy="0"/>
-          <a:chOff x="0" y="0"/>
-          <a:chExt cx="0" cy="0"/>
-        </a:xfrm>
-      </p:grpSpPr>
-      <p:sp>
-        <p:nvSpPr>
-          <p:cNvPr id="58" name="Google Shape;58;p10"/>
-          <p:cNvSpPr txBox="1">
-            <a:spLocks noGrp="1"/>
-          </p:cNvSpPr>
-          <p:nvPr>
-            <p:ph type="title"/>
-          </p:nvPr>
-        </p:nvSpPr>
-        <p:spPr>
-          <a:xfrm>
-            <a:off x="311700" y="292625"/>
-            <a:ext cx="8520600" cy="572700"/>
-          </a:xfrm>
-          <a:prstGeom prst="rect">
-            <a:avLst/>
-          </a:prstGeom>
-        </p:spPr>
-        <p:txBody>
-          <a:bodyPr spcFirstLastPara="1" wrap="square" lIns="91425" tIns="91425" rIns="91425" bIns="91425" anchor="t" anchorCtr="0">
-            <a:normAutofit fontScale="90000"/>
-          </a:bodyPr>
-          <a:lstStyle/>
-          <a:p>
-            <a:pPr marL="0" lvl="0" indent="0" algn="l" rtl="0">
-              <a:spcBef>
-                <a:spcPts val="0"/>
-              </a:spcBef>
-              <a:spcAft>
-                <a:spcPts val="0"/>
-              </a:spcAft>
-              <a:buNone/>
-            </a:pPr>
-            <a:r>
               <a:rPr lang="pt-BR"/>
               <a:t>Requisitos, ambiente e recursos</a:t>
             </a:r>
@@ -6016,7 +5716,15 @@
             </a:pPr>
             <a:r>
               <a:rPr lang="pt-BR" dirty="0"/>
-              <a:t>MySQL 5.7;</a:t>
+              <a:t>H2 </a:t>
+            </a:r>
+            <a:r>
+              <a:rPr lang="pt-BR" dirty="0" err="1"/>
+              <a:t>Database</a:t>
+            </a:r>
+            <a:r>
+              <a:rPr lang="pt-BR" dirty="0"/>
+              <a:t>;</a:t>
             </a:r>
             <a:endParaRPr lang="pt-BR" sz="1400" dirty="0"/>
           </a:p>
@@ -6035,32 +5743,12 @@
               <a:buChar char="○"/>
             </a:pPr>
             <a:r>
-              <a:rPr lang="pt-BR" dirty="0" err="1"/>
-              <a:t>Beekeeper</a:t>
+              <a:rPr lang="pt-BR"/>
+              <a:t>Seu </a:t>
             </a:r>
             <a:r>
               <a:rPr lang="pt-BR" dirty="0"/>
-              <a:t> Studio;</a:t>
-            </a:r>
-            <a:endParaRPr sz="1400" dirty="0"/>
-          </a:p>
-          <a:p>
-            <a:pPr marL="914400" lvl="1" indent="-317500" algn="l" rtl="0">
-              <a:lnSpc>
-                <a:spcPct val="150000"/>
-              </a:lnSpc>
-              <a:spcBef>
-                <a:spcPts val="0"/>
-              </a:spcBef>
-              <a:spcAft>
-                <a:spcPts val="0"/>
-              </a:spcAft>
-              <a:buSzPts val="1400"/>
-              <a:buChar char="○"/>
-            </a:pPr>
-            <a:r>
-              <a:rPr lang="pt-BR" dirty="0"/>
-              <a:t>Seu editor de código de preferência (No meu caso, </a:t>
+              <a:t>editor de código de preferência (No meu caso, </a:t>
             </a:r>
             <a:r>
               <a:rPr lang="pt-BR" dirty="0" err="1"/>
@@ -6110,7 +5798,7 @@
 </p:sld>
 </file>
 
-<file path=ppt/slides/slide9.xml><?xml version="1.0" encoding="utf-8"?>
+<file path=ppt/slides/slide8.xml><?xml version="1.0" encoding="utf-8"?>
 <p:sld xmlns:a="http://schemas.openxmlformats.org/drawingml/2006/main" xmlns:r="http://schemas.openxmlformats.org/officeDocument/2006/relationships" xmlns:p="http://schemas.openxmlformats.org/presentationml/2006/main">
   <p:cSld>
     <p:spTree>

</xml_diff>

<commit_message>
Added new info on Readme.md. Added some feature used in class.
</commit_message>
<xml_diff>
--- a/ApresentacaoSpringActuator.pptx
+++ b/ApresentacaoSpringActuator.pptx
@@ -5,34 +5,36 @@
     <p:sldMasterId id="2147483652" r:id="rId1"/>
   </p:sldMasterIdLst>
   <p:notesMasterIdLst>
-    <p:notesMasterId r:id="rId10"/>
+    <p:notesMasterId r:id="rId12"/>
   </p:notesMasterIdLst>
   <p:sldIdLst>
     <p:sldId id="256" r:id="rId2"/>
     <p:sldId id="257" r:id="rId3"/>
     <p:sldId id="258" r:id="rId4"/>
     <p:sldId id="259" r:id="rId5"/>
-    <p:sldId id="260" r:id="rId6"/>
-    <p:sldId id="265" r:id="rId7"/>
-    <p:sldId id="264" r:id="rId8"/>
-    <p:sldId id="262" r:id="rId9"/>
+    <p:sldId id="267" r:id="rId6"/>
+    <p:sldId id="260" r:id="rId7"/>
+    <p:sldId id="266" r:id="rId8"/>
+    <p:sldId id="265" r:id="rId9"/>
+    <p:sldId id="264" r:id="rId10"/>
+    <p:sldId id="262" r:id="rId11"/>
   </p:sldIdLst>
   <p:sldSz cx="9144000" cy="5143500" type="screen16x9"/>
   <p:notesSz cx="6858000" cy="9144000"/>
   <p:embeddedFontLst>
     <p:embeddedFont>
       <p:font typeface="Roboto" panose="02000000000000000000" pitchFamily="2" charset="0"/>
-      <p:regular r:id="rId11"/>
-      <p:bold r:id="rId12"/>
-      <p:italic r:id="rId13"/>
-      <p:boldItalic r:id="rId14"/>
+      <p:regular r:id="rId13"/>
+      <p:bold r:id="rId14"/>
+      <p:italic r:id="rId15"/>
+      <p:boldItalic r:id="rId16"/>
     </p:embeddedFont>
     <p:embeddedFont>
       <p:font typeface="Roboto Light" panose="02000000000000000000" pitchFamily="2" charset="0"/>
-      <p:regular r:id="rId15"/>
-      <p:bold r:id="rId16"/>
-      <p:italic r:id="rId17"/>
-      <p:boldItalic r:id="rId18"/>
+      <p:regular r:id="rId17"/>
+      <p:bold r:id="rId18"/>
+      <p:italic r:id="rId19"/>
+      <p:boldItalic r:id="rId20"/>
     </p:embeddedFont>
   </p:embeddedFontLst>
   <p:defaultTextStyle>
@@ -832,6 +834,114 @@
 </p:notes>
 </file>
 
+<file path=ppt/notesSlides/notesSlide10.xml><?xml version="1.0" encoding="utf-8"?>
+<p:notes xmlns:a="http://schemas.openxmlformats.org/drawingml/2006/main" xmlns:r="http://schemas.openxmlformats.org/officeDocument/2006/relationships" xmlns:p="http://schemas.openxmlformats.org/presentationml/2006/main" showMasterSp="0" showMasterPhAnim="0">
+  <p:cSld>
+    <p:spTree>
+      <p:nvGrpSpPr>
+        <p:cNvPr id="1" name="Shape 66"/>
+        <p:cNvGrpSpPr/>
+        <p:nvPr/>
+      </p:nvGrpSpPr>
+      <p:grpSpPr>
+        <a:xfrm>
+          <a:off x="0" y="0"/>
+          <a:ext cx="0" cy="0"/>
+          <a:chOff x="0" y="0"/>
+          <a:chExt cx="0" cy="0"/>
+        </a:xfrm>
+      </p:grpSpPr>
+      <p:sp>
+        <p:nvSpPr>
+          <p:cNvPr id="67" name="Google Shape;67;gd8e9b03fd4_0_117:notes"/>
+          <p:cNvSpPr>
+            <a:spLocks noGrp="1" noRot="1" noChangeAspect="1"/>
+          </p:cNvSpPr>
+          <p:nvPr>
+            <p:ph type="sldImg" idx="2"/>
+          </p:nvPr>
+        </p:nvSpPr>
+        <p:spPr>
+          <a:xfrm>
+            <a:off x="381000" y="685800"/>
+            <a:ext cx="6096000" cy="3429000"/>
+          </a:xfrm>
+          <a:custGeom>
+            <a:avLst/>
+            <a:gdLst/>
+            <a:ahLst/>
+            <a:cxnLst/>
+            <a:rect l="l" t="t" r="r" b="b"/>
+            <a:pathLst>
+              <a:path w="120000" h="120000" extrusionOk="0">
+                <a:moveTo>
+                  <a:pt x="0" y="0"/>
+                </a:moveTo>
+                <a:lnTo>
+                  <a:pt x="120000" y="0"/>
+                </a:lnTo>
+                <a:lnTo>
+                  <a:pt x="120000" y="120000"/>
+                </a:lnTo>
+                <a:lnTo>
+                  <a:pt x="0" y="120000"/>
+                </a:lnTo>
+                <a:close/>
+              </a:path>
+            </a:pathLst>
+          </a:custGeom>
+        </p:spPr>
+      </p:sp>
+      <p:sp>
+        <p:nvSpPr>
+          <p:cNvPr id="68" name="Google Shape;68;gd8e9b03fd4_0_117:notes"/>
+          <p:cNvSpPr txBox="1">
+            <a:spLocks noGrp="1"/>
+          </p:cNvSpPr>
+          <p:nvPr>
+            <p:ph type="body" idx="1"/>
+          </p:nvPr>
+        </p:nvSpPr>
+        <p:spPr>
+          <a:xfrm>
+            <a:off x="685800" y="4343400"/>
+            <a:ext cx="5486400" cy="4114800"/>
+          </a:xfrm>
+          <a:prstGeom prst="rect">
+            <a:avLst/>
+          </a:prstGeom>
+        </p:spPr>
+        <p:txBody>
+          <a:bodyPr spcFirstLastPara="1" wrap="square" lIns="91425" tIns="91425" rIns="91425" bIns="91425" anchor="t" anchorCtr="0">
+            <a:noAutofit/>
+          </a:bodyPr>
+          <a:lstStyle/>
+          <a:p>
+            <a:pPr marL="0" lvl="0" indent="0" algn="l" rtl="0">
+              <a:spcBef>
+                <a:spcPts val="0"/>
+              </a:spcBef>
+              <a:spcAft>
+                <a:spcPts val="0"/>
+              </a:spcAft>
+              <a:buNone/>
+            </a:pPr>
+            <a:r>
+              <a:rPr lang="pt-BR"/>
+              <a:t>Objetivo: agradecer!</a:t>
+            </a:r>
+            <a:endParaRPr/>
+          </a:p>
+        </p:txBody>
+      </p:sp>
+    </p:spTree>
+  </p:cSld>
+  <p:clrMapOvr>
+    <a:masterClrMapping/>
+  </p:clrMapOvr>
+</p:notes>
+</file>
+
 <file path=ppt/notesSlides/notesSlide2.xml><?xml version="1.0" encoding="utf-8"?>
 <p:notes xmlns:a="http://schemas.openxmlformats.org/drawingml/2006/main" xmlns:r="http://schemas.openxmlformats.org/officeDocument/2006/relationships" xmlns:p="http://schemas.openxmlformats.org/presentationml/2006/main" showMasterSp="0" showMasterPhAnim="0">
   <p:cSld>
@@ -1161,7 +1271,7 @@
   <p:cSld>
     <p:spTree>
       <p:nvGrpSpPr>
-        <p:cNvPr id="1" name="Shape 54"/>
+        <p:cNvPr id="1" name="Shape 48"/>
         <p:cNvGrpSpPr/>
         <p:nvPr/>
       </p:nvGrpSpPr>
@@ -1175,7 +1285,7 @@
       </p:grpSpPr>
       <p:sp>
         <p:nvSpPr>
-          <p:cNvPr id="55" name="Google Shape;55;gd8e9b03fd4_0_15:notes"/>
+          <p:cNvPr id="49" name="Google Shape;49;gd8e9b03fd4_0_10:notes"/>
           <p:cNvSpPr>
             <a:spLocks noGrp="1" noRot="1" noChangeAspect="1"/>
           </p:cNvSpPr>
@@ -1216,7 +1326,7 @@
       </p:sp>
       <p:sp>
         <p:nvSpPr>
-          <p:cNvPr id="56" name="Google Shape;56;gd8e9b03fd4_0_15:notes"/>
+          <p:cNvPr id="50" name="Google Shape;50;gd8e9b03fd4_0_10:notes"/>
           <p:cNvSpPr txBox="1">
             <a:spLocks noGrp="1"/>
           </p:cNvSpPr>
@@ -1250,13 +1360,18 @@
             </a:pPr>
             <a:r>
               <a:rPr lang="pt-BR"/>
-              <a:t>Objetivo: informar à audiência o que é necessário para melhor aproveitamento do conteúdo.</a:t>
+              <a:t>Objetivo: apresentar mais informações sobre a aula e o que será entregue com mais detalhamento.</a:t>
             </a:r>
             <a:endParaRPr/>
           </a:p>
         </p:txBody>
       </p:sp>
     </p:spTree>
+    <p:extLst>
+      <p:ext uri="{BB962C8B-B14F-4D97-AF65-F5344CB8AC3E}">
+        <p14:creationId xmlns:p14="http://schemas.microsoft.com/office/powerpoint/2010/main" val="3914458540"/>
+      </p:ext>
+    </p:extLst>
   </p:cSld>
   <p:clrMapOvr>
     <a:masterClrMapping/>
@@ -1365,11 +1480,6 @@
         </p:txBody>
       </p:sp>
     </p:spTree>
-    <p:extLst>
-      <p:ext uri="{BB962C8B-B14F-4D97-AF65-F5344CB8AC3E}">
-        <p14:creationId xmlns:p14="http://schemas.microsoft.com/office/powerpoint/2010/main" val="1545179741"/>
-      </p:ext>
-    </p:extLst>
   </p:cSld>
   <p:clrMapOvr>
     <a:masterClrMapping/>
@@ -1480,7 +1590,7 @@
     </p:spTree>
     <p:extLst>
       <p:ext uri="{BB962C8B-B14F-4D97-AF65-F5344CB8AC3E}">
-        <p14:creationId xmlns:p14="http://schemas.microsoft.com/office/powerpoint/2010/main" val="729362283"/>
+        <p14:creationId xmlns:p14="http://schemas.microsoft.com/office/powerpoint/2010/main" val="3944719296"/>
       </p:ext>
     </p:extLst>
   </p:cSld>
@@ -1495,7 +1605,7 @@
   <p:cSld>
     <p:spTree>
       <p:nvGrpSpPr>
-        <p:cNvPr id="1" name="Shape 66"/>
+        <p:cNvPr id="1" name="Shape 54"/>
         <p:cNvGrpSpPr/>
         <p:nvPr/>
       </p:nvGrpSpPr>
@@ -1509,7 +1619,7 @@
       </p:grpSpPr>
       <p:sp>
         <p:nvSpPr>
-          <p:cNvPr id="67" name="Google Shape;67;gd8e9b03fd4_0_117:notes"/>
+          <p:cNvPr id="55" name="Google Shape;55;gd8e9b03fd4_0_15:notes"/>
           <p:cNvSpPr>
             <a:spLocks noGrp="1" noRot="1" noChangeAspect="1"/>
           </p:cNvSpPr>
@@ -1550,7 +1660,7 @@
       </p:sp>
       <p:sp>
         <p:nvSpPr>
-          <p:cNvPr id="68" name="Google Shape;68;gd8e9b03fd4_0_117:notes"/>
+          <p:cNvPr id="56" name="Google Shape;56;gd8e9b03fd4_0_15:notes"/>
           <p:cNvSpPr txBox="1">
             <a:spLocks noGrp="1"/>
           </p:cNvSpPr>
@@ -1584,13 +1694,131 @@
             </a:pPr>
             <a:r>
               <a:rPr lang="pt-BR"/>
-              <a:t>Objetivo: agradecer!</a:t>
+              <a:t>Objetivo: informar à audiência o que é necessário para melhor aproveitamento do conteúdo.</a:t>
             </a:r>
             <a:endParaRPr/>
           </a:p>
         </p:txBody>
       </p:sp>
     </p:spTree>
+    <p:extLst>
+      <p:ext uri="{BB962C8B-B14F-4D97-AF65-F5344CB8AC3E}">
+        <p14:creationId xmlns:p14="http://schemas.microsoft.com/office/powerpoint/2010/main" val="1545179741"/>
+      </p:ext>
+    </p:extLst>
+  </p:cSld>
+  <p:clrMapOvr>
+    <a:masterClrMapping/>
+  </p:clrMapOvr>
+</p:notes>
+</file>
+
+<file path=ppt/notesSlides/notesSlide9.xml><?xml version="1.0" encoding="utf-8"?>
+<p:notes xmlns:a="http://schemas.openxmlformats.org/drawingml/2006/main" xmlns:r="http://schemas.openxmlformats.org/officeDocument/2006/relationships" xmlns:p="http://schemas.openxmlformats.org/presentationml/2006/main" showMasterSp="0" showMasterPhAnim="0">
+  <p:cSld>
+    <p:spTree>
+      <p:nvGrpSpPr>
+        <p:cNvPr id="1" name="Shape 54"/>
+        <p:cNvGrpSpPr/>
+        <p:nvPr/>
+      </p:nvGrpSpPr>
+      <p:grpSpPr>
+        <a:xfrm>
+          <a:off x="0" y="0"/>
+          <a:ext cx="0" cy="0"/>
+          <a:chOff x="0" y="0"/>
+          <a:chExt cx="0" cy="0"/>
+        </a:xfrm>
+      </p:grpSpPr>
+      <p:sp>
+        <p:nvSpPr>
+          <p:cNvPr id="55" name="Google Shape;55;gd8e9b03fd4_0_15:notes"/>
+          <p:cNvSpPr>
+            <a:spLocks noGrp="1" noRot="1" noChangeAspect="1"/>
+          </p:cNvSpPr>
+          <p:nvPr>
+            <p:ph type="sldImg" idx="2"/>
+          </p:nvPr>
+        </p:nvSpPr>
+        <p:spPr>
+          <a:xfrm>
+            <a:off x="381000" y="685800"/>
+            <a:ext cx="6096000" cy="3429000"/>
+          </a:xfrm>
+          <a:custGeom>
+            <a:avLst/>
+            <a:gdLst/>
+            <a:ahLst/>
+            <a:cxnLst/>
+            <a:rect l="l" t="t" r="r" b="b"/>
+            <a:pathLst>
+              <a:path w="120000" h="120000" extrusionOk="0">
+                <a:moveTo>
+                  <a:pt x="0" y="0"/>
+                </a:moveTo>
+                <a:lnTo>
+                  <a:pt x="120000" y="0"/>
+                </a:lnTo>
+                <a:lnTo>
+                  <a:pt x="120000" y="120000"/>
+                </a:lnTo>
+                <a:lnTo>
+                  <a:pt x="0" y="120000"/>
+                </a:lnTo>
+                <a:close/>
+              </a:path>
+            </a:pathLst>
+          </a:custGeom>
+        </p:spPr>
+      </p:sp>
+      <p:sp>
+        <p:nvSpPr>
+          <p:cNvPr id="56" name="Google Shape;56;gd8e9b03fd4_0_15:notes"/>
+          <p:cNvSpPr txBox="1">
+            <a:spLocks noGrp="1"/>
+          </p:cNvSpPr>
+          <p:nvPr>
+            <p:ph type="body" idx="1"/>
+          </p:nvPr>
+        </p:nvSpPr>
+        <p:spPr>
+          <a:xfrm>
+            <a:off x="685800" y="4343400"/>
+            <a:ext cx="5486400" cy="4114800"/>
+          </a:xfrm>
+          <a:prstGeom prst="rect">
+            <a:avLst/>
+          </a:prstGeom>
+        </p:spPr>
+        <p:txBody>
+          <a:bodyPr spcFirstLastPara="1" wrap="square" lIns="91425" tIns="91425" rIns="91425" bIns="91425" anchor="t" anchorCtr="0">
+            <a:noAutofit/>
+          </a:bodyPr>
+          <a:lstStyle/>
+          <a:p>
+            <a:pPr marL="0" lvl="0" indent="0" algn="l" rtl="0">
+              <a:spcBef>
+                <a:spcPts val="0"/>
+              </a:spcBef>
+              <a:spcAft>
+                <a:spcPts val="0"/>
+              </a:spcAft>
+              <a:buNone/>
+            </a:pPr>
+            <a:r>
+              <a:rPr lang="pt-BR"/>
+              <a:t>Objetivo: informar à audiência o que é necessário para melhor aproveitamento do conteúdo.</a:t>
+            </a:r>
+            <a:endParaRPr/>
+          </a:p>
+        </p:txBody>
+      </p:sp>
+    </p:spTree>
+    <p:extLst>
+      <p:ext uri="{BB962C8B-B14F-4D97-AF65-F5344CB8AC3E}">
+        <p14:creationId xmlns:p14="http://schemas.microsoft.com/office/powerpoint/2010/main" val="729362283"/>
+      </p:ext>
+    </p:extLst>
   </p:cSld>
   <p:clrMapOvr>
     <a:masterClrMapping/>
@@ -4123,7 +4351,7 @@
             </a:pPr>
             <a:r>
               <a:rPr lang="pt-BR" sz="4000" dirty="0"/>
-              <a:t>Construindo um serviço Web </a:t>
+              <a:t>Monitorando sua aplicação Spring </a:t>
             </a:r>
             <a:r>
               <a:rPr lang="pt-BR" sz="4000" dirty="0" err="1"/>
@@ -4181,7 +4409,7 @@
             </a:pPr>
             <a:r>
               <a:rPr lang="pt-BR" dirty="0"/>
-              <a:t>05/06/2021</a:t>
+              <a:t>12/06/2021</a:t>
             </a:r>
             <a:endParaRPr dirty="0"/>
           </a:p>
@@ -4224,6 +4452,224 @@
               <a:buNone/>
             </a:pPr>
             <a:endParaRPr/>
+          </a:p>
+        </p:txBody>
+      </p:sp>
+    </p:spTree>
+  </p:cSld>
+  <p:clrMapOvr>
+    <a:masterClrMapping/>
+  </p:clrMapOvr>
+</p:sld>
+</file>
+
+<file path=ppt/slides/slide10.xml><?xml version="1.0" encoding="utf-8"?>
+<p:sld xmlns:a="http://schemas.openxmlformats.org/drawingml/2006/main" xmlns:r="http://schemas.openxmlformats.org/officeDocument/2006/relationships" xmlns:p="http://schemas.openxmlformats.org/presentationml/2006/main">
+  <p:cSld>
+    <p:spTree>
+      <p:nvGrpSpPr>
+        <p:cNvPr id="1" name="Shape 69"/>
+        <p:cNvGrpSpPr/>
+        <p:nvPr/>
+      </p:nvGrpSpPr>
+      <p:grpSpPr>
+        <a:xfrm>
+          <a:off x="0" y="0"/>
+          <a:ext cx="0" cy="0"/>
+          <a:chOff x="0" y="0"/>
+          <a:chExt cx="0" cy="0"/>
+        </a:xfrm>
+      </p:grpSpPr>
+      <p:sp>
+        <p:nvSpPr>
+          <p:cNvPr id="70" name="Google Shape;70;p12"/>
+          <p:cNvSpPr txBox="1">
+            <a:spLocks noGrp="1"/>
+          </p:cNvSpPr>
+          <p:nvPr>
+            <p:ph type="ctrTitle"/>
+          </p:nvPr>
+        </p:nvSpPr>
+        <p:spPr>
+          <a:xfrm>
+            <a:off x="311706" y="1537300"/>
+            <a:ext cx="6451500" cy="985200"/>
+          </a:xfrm>
+          <a:prstGeom prst="rect">
+            <a:avLst/>
+          </a:prstGeom>
+        </p:spPr>
+        <p:txBody>
+          <a:bodyPr spcFirstLastPara="1" wrap="square" lIns="91425" tIns="91425" rIns="91425" bIns="91425" anchor="ctr" anchorCtr="0">
+            <a:spAutoFit/>
+          </a:bodyPr>
+          <a:lstStyle/>
+          <a:p>
+            <a:pPr marL="0" lvl="0" indent="0" algn="l" rtl="0">
+              <a:spcBef>
+                <a:spcPts val="0"/>
+              </a:spcBef>
+              <a:spcAft>
+                <a:spcPts val="0"/>
+              </a:spcAft>
+              <a:buNone/>
+            </a:pPr>
+            <a:r>
+              <a:rPr lang="pt-BR" dirty="0">
+                <a:solidFill>
+                  <a:srgbClr val="D8A853"/>
+                </a:solidFill>
+              </a:rPr>
+              <a:t>Obrigado!</a:t>
+            </a:r>
+            <a:endParaRPr dirty="0">
+              <a:solidFill>
+                <a:srgbClr val="D8A853"/>
+              </a:solidFill>
+            </a:endParaRPr>
+          </a:p>
+        </p:txBody>
+      </p:sp>
+      <p:sp>
+        <p:nvSpPr>
+          <p:cNvPr id="71" name="Google Shape;71;p12"/>
+          <p:cNvSpPr txBox="1">
+            <a:spLocks noGrp="1"/>
+          </p:cNvSpPr>
+          <p:nvPr>
+            <p:ph type="subTitle" idx="1"/>
+          </p:nvPr>
+        </p:nvSpPr>
+        <p:spPr>
+          <a:xfrm>
+            <a:off x="311700" y="2765275"/>
+            <a:ext cx="6451500" cy="1954351"/>
+          </a:xfrm>
+          <a:prstGeom prst="rect">
+            <a:avLst/>
+          </a:prstGeom>
+        </p:spPr>
+        <p:txBody>
+          <a:bodyPr spcFirstLastPara="1" wrap="square" lIns="91425" tIns="91425" rIns="91425" bIns="91425" anchor="ctr" anchorCtr="0">
+            <a:spAutoFit/>
+          </a:bodyPr>
+          <a:lstStyle/>
+          <a:p>
+            <a:pPr marL="0" lvl="0" indent="0" algn="l" rtl="0">
+              <a:lnSpc>
+                <a:spcPct val="115000"/>
+              </a:lnSpc>
+              <a:spcBef>
+                <a:spcPts val="0"/>
+              </a:spcBef>
+              <a:spcAft>
+                <a:spcPts val="0"/>
+              </a:spcAft>
+              <a:buNone/>
+            </a:pPr>
+            <a:r>
+              <a:rPr lang="pt-BR" b="1" dirty="0">
+                <a:solidFill>
+                  <a:schemeClr val="lt1"/>
+                </a:solidFill>
+                <a:latin typeface="Roboto"/>
+                <a:ea typeface="Roboto"/>
+                <a:cs typeface="Roboto"/>
+                <a:sym typeface="Roboto"/>
+              </a:rPr>
+              <a:t>Pedro Henrique Lacombe </a:t>
+            </a:r>
+            <a:r>
+              <a:rPr lang="pt-BR" dirty="0">
+                <a:solidFill>
+                  <a:schemeClr val="lt1"/>
+                </a:solidFill>
+                <a:uFill>
+                  <a:noFill/>
+                </a:uFill>
+                <a:hlinkClick r:id="rId3">
+                  <a:extLst>
+                    <a:ext uri="{A12FA001-AC4F-418D-AE19-62706E023703}">
+                      <ahyp:hlinkClr xmlns:ahyp="http://schemas.microsoft.com/office/drawing/2018/hyperlinkcolor" val="tx"/>
+                    </a:ext>
+                  </a:extLst>
+                </a:hlinkClick>
+              </a:rPr>
+              <a:t>pedrohenriquelacombe@gmail.com</a:t>
+            </a:r>
+            <a:endParaRPr dirty="0">
+              <a:solidFill>
+                <a:schemeClr val="lt1"/>
+              </a:solidFill>
+            </a:endParaRPr>
+          </a:p>
+          <a:p>
+            <a:pPr marL="0" lvl="0" indent="0" algn="l" rtl="0">
+              <a:lnSpc>
+                <a:spcPct val="115000"/>
+              </a:lnSpc>
+              <a:spcBef>
+                <a:spcPts val="0"/>
+              </a:spcBef>
+              <a:spcAft>
+                <a:spcPts val="0"/>
+              </a:spcAft>
+              <a:buNone/>
+            </a:pPr>
+            <a:r>
+              <a:rPr lang="pt-BR" dirty="0">
+                <a:solidFill>
+                  <a:schemeClr val="lt1"/>
+                </a:solidFill>
+              </a:rPr>
+              <a:t>Redes sociais: </a:t>
+            </a:r>
+          </a:p>
+          <a:p>
+            <a:pPr marL="0" lvl="0" indent="0" algn="l" rtl="0">
+              <a:lnSpc>
+                <a:spcPct val="115000"/>
+              </a:lnSpc>
+              <a:spcBef>
+                <a:spcPts val="0"/>
+              </a:spcBef>
+              <a:spcAft>
+                <a:spcPts val="0"/>
+              </a:spcAft>
+              <a:buNone/>
+            </a:pPr>
+            <a:r>
+              <a:rPr lang="pt-BR" dirty="0">
+                <a:hlinkClick r:id="rId4"/>
+              </a:rPr>
+              <a:t>https://github.com/PedroLacombe</a:t>
+            </a:r>
+            <a:endParaRPr lang="pt-BR" dirty="0"/>
+          </a:p>
+          <a:p>
+            <a:pPr marL="0" lvl="0" indent="0" algn="l" rtl="0">
+              <a:lnSpc>
+                <a:spcPct val="115000"/>
+              </a:lnSpc>
+              <a:spcBef>
+                <a:spcPts val="0"/>
+              </a:spcBef>
+              <a:spcAft>
+                <a:spcPts val="0"/>
+              </a:spcAft>
+              <a:buNone/>
+            </a:pPr>
+            <a:r>
+              <a:rPr lang="pt-BR" dirty="0">
+                <a:hlinkClick r:id="rId5"/>
+              </a:rPr>
+              <a:t>https://www.linkedin.com/in/pedrohenriquelacombe</a:t>
+            </a:r>
+            <a:endParaRPr lang="pt-BR" dirty="0">
+              <a:solidFill>
+                <a:schemeClr val="lt1"/>
+              </a:solidFill>
+            </a:endParaRPr>
           </a:p>
         </p:txBody>
       </p:sp>
@@ -4555,7 +5001,6 @@
               <a:rPr lang="pt-BR" dirty="0"/>
               <a:t>6 anos no mercado e 2 anos como instrutor;</a:t>
             </a:r>
-            <a:endParaRPr dirty="0"/>
           </a:p>
           <a:p>
             <a:pPr marL="457200" lvl="0" indent="-342900" algn="l" rtl="0">
@@ -4836,15 +5281,15 @@
             </a:pPr>
             <a:r>
               <a:rPr lang="pt-BR" dirty="0"/>
-              <a:t>Criar uma API </a:t>
+              <a:t>Como utilizar o Spring </a:t>
             </a:r>
             <a:r>
               <a:rPr lang="pt-BR" dirty="0" err="1"/>
-              <a:t>RESTful</a:t>
+              <a:t>Actuator</a:t>
             </a:r>
             <a:r>
               <a:rPr lang="pt-BR" dirty="0"/>
-              <a:t>;</a:t>
+              <a:t> para monitorar sua aplicação;</a:t>
             </a:r>
           </a:p>
           <a:p>
@@ -4863,15 +5308,7 @@
             </a:pPr>
             <a:r>
               <a:rPr lang="pt-BR" dirty="0"/>
-              <a:t>Como utilizar o </a:t>
-            </a:r>
-            <a:r>
-              <a:rPr lang="pt-BR" dirty="0" err="1"/>
-              <a:t>Actuator</a:t>
-            </a:r>
-            <a:r>
-              <a:rPr lang="pt-BR" dirty="0"/>
-              <a:t> para monitorar sua aplicação;</a:t>
+              <a:t>Desenvolvendo sua própria métrica de monitoramento;</a:t>
             </a:r>
           </a:p>
           <a:p>
@@ -4898,7 +5335,7 @@
             </a:r>
             <a:r>
               <a:rPr lang="pt-BR" dirty="0"/>
-              <a:t> do Spring Boot </a:t>
+              <a:t> mais utilizados do Spring Boot </a:t>
             </a:r>
             <a:r>
               <a:rPr lang="pt-BR" dirty="0" err="1"/>
@@ -4939,7 +5376,42 @@
             </a:r>
             <a:r>
               <a:rPr lang="pt-BR" dirty="0"/>
+              <a:t>, </a:t>
+            </a:r>
+            <a:r>
+              <a:rPr lang="pt-BR" dirty="0" err="1"/>
+              <a:t>scheduledtasks</a:t>
+            </a:r>
+            <a:r>
+              <a:rPr lang="pt-BR" dirty="0"/>
+              <a:t>, </a:t>
+            </a:r>
+            <a:r>
+              <a:rPr lang="pt-BR" dirty="0" err="1"/>
+              <a:t>env</a:t>
+            </a:r>
+            <a:r>
+              <a:rPr lang="pt-BR" dirty="0"/>
               <a:t> e muito mais;</a:t>
+            </a:r>
+          </a:p>
+          <a:p>
+            <a:pPr>
+              <a:lnSpc>
+                <a:spcPct val="150000"/>
+              </a:lnSpc>
+            </a:pPr>
+            <a:r>
+              <a:rPr lang="pt-BR" dirty="0"/>
+              <a:t>Criando </a:t>
+            </a:r>
+            <a:r>
+              <a:rPr lang="pt-BR" dirty="0" err="1"/>
+              <a:t>endpoints</a:t>
+            </a:r>
+            <a:r>
+              <a:rPr lang="pt-BR" dirty="0"/>
+              <a:t> personalizados;</a:t>
             </a:r>
           </a:p>
           <a:p>
@@ -4979,7 +5451,7 @@
   <p:cSld>
     <p:spTree>
       <p:nvGrpSpPr>
-        <p:cNvPr id="1" name="Shape 57"/>
+        <p:cNvPr id="1" name="Shape 51"/>
         <p:cNvGrpSpPr/>
         <p:nvPr/>
       </p:nvGrpSpPr>
@@ -4993,7 +5465,7 @@
       </p:grpSpPr>
       <p:sp>
         <p:nvSpPr>
-          <p:cNvPr id="58" name="Google Shape;58;p10"/>
+          <p:cNvPr id="52" name="Google Shape;52;p9"/>
           <p:cNvSpPr txBox="1">
             <a:spLocks noGrp="1"/>
           </p:cNvSpPr>
@@ -5026,151 +5498,49 @@
               <a:buNone/>
             </a:pPr>
             <a:r>
-              <a:rPr lang="pt-BR" dirty="0"/>
-              <a:t>Spring Boot </a:t>
-            </a:r>
-            <a:r>
-              <a:rPr lang="pt-BR" dirty="0" err="1"/>
-              <a:t>Actuator</a:t>
-            </a:r>
-            <a:endParaRPr dirty="0"/>
+              <a:rPr lang="pt-BR"/>
+              <a:t>Sobre a aula e o que será entregue no final</a:t>
+            </a:r>
+            <a:endParaRPr/>
           </a:p>
         </p:txBody>
       </p:sp>
-      <p:sp>
-        <p:nvSpPr>
-          <p:cNvPr id="59" name="Google Shape;59;p10"/>
-          <p:cNvSpPr txBox="1">
-            <a:spLocks noGrp="1"/>
-          </p:cNvSpPr>
-          <p:nvPr>
-            <p:ph type="body" idx="1"/>
-          </p:nvPr>
-        </p:nvSpPr>
+      <p:pic>
+        <p:nvPicPr>
+          <p:cNvPr id="3" name="Imagem 2">
+            <a:extLst>
+              <a:ext uri="{FF2B5EF4-FFF2-40B4-BE49-F238E27FC236}">
+                <a16:creationId xmlns:a16="http://schemas.microsoft.com/office/drawing/2014/main" id="{4E8D42DB-020B-40EE-A704-2F32F8B41FDF}"/>
+              </a:ext>
+            </a:extLst>
+          </p:cNvPr>
+          <p:cNvPicPr>
+            <a:picLocks noChangeAspect="1"/>
+          </p:cNvPicPr>
+          <p:nvPr/>
+        </p:nvPicPr>
+        <p:blipFill>
+          <a:blip r:embed="rId3"/>
+          <a:stretch>
+            <a:fillRect/>
+          </a:stretch>
+        </p:blipFill>
         <p:spPr>
           <a:xfrm>
-            <a:off x="311700" y="1000075"/>
-            <a:ext cx="8520600" cy="3416400"/>
+            <a:off x="1558982" y="865325"/>
+            <a:ext cx="6026035" cy="4011237"/>
           </a:xfrm>
           <a:prstGeom prst="rect">
             <a:avLst/>
           </a:prstGeom>
         </p:spPr>
-        <p:txBody>
-          <a:bodyPr spcFirstLastPara="1" wrap="square" lIns="91425" tIns="91425" rIns="91425" bIns="91425" anchor="t" anchorCtr="0">
-            <a:normAutofit/>
-          </a:bodyPr>
-          <a:lstStyle/>
-          <a:p>
-            <a:pPr marL="457200" lvl="0" indent="-342900" algn="l" rtl="0">
-              <a:lnSpc>
-                <a:spcPct val="150000"/>
-              </a:lnSpc>
-              <a:spcBef>
-                <a:spcPts val="0"/>
-              </a:spcBef>
-              <a:spcAft>
-                <a:spcPts val="0"/>
-              </a:spcAft>
-              <a:buSzPts val="1800"/>
-              <a:buChar char="●"/>
-            </a:pPr>
-            <a:r>
-              <a:rPr lang="pt-BR" dirty="0"/>
-              <a:t>O que é o Spring </a:t>
-            </a:r>
-            <a:r>
-              <a:rPr lang="pt-BR" dirty="0" err="1"/>
-              <a:t>Actuator</a:t>
-            </a:r>
-            <a:r>
-              <a:rPr lang="pt-BR" dirty="0"/>
-              <a:t>?</a:t>
-            </a:r>
-            <a:endParaRPr dirty="0"/>
-          </a:p>
-          <a:p>
-            <a:pPr marL="914400" lvl="1" indent="-317500" algn="l" rtl="0">
-              <a:lnSpc>
-                <a:spcPct val="150000"/>
-              </a:lnSpc>
-              <a:spcBef>
-                <a:spcPts val="0"/>
-              </a:spcBef>
-              <a:spcAft>
-                <a:spcPts val="0"/>
-              </a:spcAft>
-              <a:buSzPts val="1400"/>
-              <a:buChar char="○"/>
-            </a:pPr>
-            <a:r>
-              <a:rPr lang="pt-BR" dirty="0"/>
-              <a:t>É um subprojeto do Spring Framework com o objetivo de monitorar a aplicação, coletar métricas, entender o tráfico ou o estado de nosso sistema.</a:t>
-            </a:r>
-          </a:p>
-          <a:p>
-            <a:pPr marL="914400" lvl="1" indent="-317500" algn="l" rtl="0">
-              <a:lnSpc>
-                <a:spcPct val="150000"/>
-              </a:lnSpc>
-              <a:spcBef>
-                <a:spcPts val="0"/>
-              </a:spcBef>
-              <a:spcAft>
-                <a:spcPts val="0"/>
-              </a:spcAft>
-              <a:buSzPts val="1400"/>
-              <a:buChar char="○"/>
-            </a:pPr>
-            <a:r>
-              <a:rPr lang="pt-BR" dirty="0"/>
-              <a:t>Utilizado principalmente para expor informações operacionais sobre a aplicação em execução. Como por exemplo:</a:t>
-            </a:r>
-          </a:p>
-          <a:p>
-            <a:pPr lvl="2">
-              <a:lnSpc>
-                <a:spcPct val="150000"/>
-              </a:lnSpc>
-              <a:buChar char="○"/>
-            </a:pPr>
-            <a:r>
-              <a:rPr lang="pt-BR" dirty="0" err="1"/>
-              <a:t>health</a:t>
-            </a:r>
-            <a:r>
-              <a:rPr lang="pt-BR" dirty="0"/>
-              <a:t>, </a:t>
-            </a:r>
-            <a:r>
-              <a:rPr lang="pt-BR" dirty="0" err="1"/>
-              <a:t>metrics</a:t>
-            </a:r>
-            <a:r>
-              <a:rPr lang="pt-BR" dirty="0"/>
-              <a:t>, </a:t>
-            </a:r>
-            <a:r>
-              <a:rPr lang="pt-BR" dirty="0" err="1"/>
-              <a:t>info</a:t>
-            </a:r>
-            <a:r>
-              <a:rPr lang="pt-BR" dirty="0"/>
-              <a:t>, etc...</a:t>
-            </a:r>
-          </a:p>
-          <a:p>
-            <a:pPr lvl="2">
-              <a:lnSpc>
-                <a:spcPct val="150000"/>
-              </a:lnSpc>
-              <a:buChar char="○"/>
-            </a:pPr>
-            <a:endParaRPr lang="pt-BR" dirty="0"/>
-          </a:p>
-        </p:txBody>
-      </p:sp>
+      </p:pic>
     </p:spTree>
+    <p:extLst>
+      <p:ext uri="{BB962C8B-B14F-4D97-AF65-F5344CB8AC3E}">
+        <p14:creationId xmlns:p14="http://schemas.microsoft.com/office/powerpoint/2010/main" val="2374393363"/>
+      </p:ext>
+    </p:extLst>
   </p:cSld>
   <p:clrMapOvr>
     <a:masterClrMapping/>
@@ -5253,8 +5623,8 @@
         </p:nvSpPr>
         <p:spPr>
           <a:xfrm>
-            <a:off x="311700" y="865325"/>
-            <a:ext cx="6405106" cy="4029125"/>
+            <a:off x="311700" y="1000075"/>
+            <a:ext cx="8520600" cy="3416400"/>
           </a:xfrm>
           <a:prstGeom prst="rect">
             <a:avLst/>
@@ -5281,15 +5651,15 @@
             </a:pPr>
             <a:r>
               <a:rPr lang="pt-BR" dirty="0"/>
-              <a:t>Alguns dos </a:t>
+              <a:t>O que é o Spring </a:t>
             </a:r>
             <a:r>
               <a:rPr lang="pt-BR" dirty="0" err="1"/>
-              <a:t>endpoints</a:t>
+              <a:t>Actuator</a:t>
             </a:r>
             <a:r>
               <a:rPr lang="pt-BR" dirty="0"/>
-              <a:t> mais utilizados:</a:t>
+              <a:t>?</a:t>
             </a:r>
             <a:endParaRPr dirty="0"/>
           </a:p>
@@ -5308,23 +5678,25 @@
               <a:buChar char="○"/>
             </a:pPr>
             <a:r>
-              <a:rPr lang="pt-BR" dirty="0" err="1">
-                <a:latin typeface="Roboto" panose="02000000000000000000" pitchFamily="2" charset="0"/>
-                <a:ea typeface="Roboto" panose="02000000000000000000" pitchFamily="2" charset="0"/>
-              </a:rPr>
-              <a:t>Actuator</a:t>
-            </a:r>
-            <a:r>
-              <a:rPr lang="pt-BR" dirty="0">
-                <a:latin typeface="Roboto" panose="02000000000000000000" pitchFamily="2" charset="0"/>
-                <a:ea typeface="Roboto" panose="02000000000000000000" pitchFamily="2" charset="0"/>
-              </a:rPr>
-              <a:t>;</a:t>
-            </a:r>
-            <a:endParaRPr dirty="0">
-              <a:latin typeface="Roboto" panose="02000000000000000000" pitchFamily="2" charset="0"/>
-              <a:ea typeface="Roboto" panose="02000000000000000000" pitchFamily="2" charset="0"/>
-            </a:endParaRPr>
+              <a:rPr lang="pt-BR" dirty="0"/>
+              <a:t>É um subprojeto do Spring Framework com o objetivo de monitorar uma aplicação, coletar métricas, entender </a:t>
+            </a:r>
+            <a:r>
+              <a:rPr lang="pt-BR"/>
+              <a:t>o tráfego HTTP </a:t>
+            </a:r>
+            <a:r>
+              <a:rPr lang="pt-BR" dirty="0"/>
+              <a:t>ou o </a:t>
+            </a:r>
+            <a:r>
+              <a:rPr lang="pt-BR"/>
+              <a:t>estado do </a:t>
+            </a:r>
+            <a:r>
+              <a:rPr lang="pt-BR" dirty="0"/>
+              <a:t>nosso sistema.</a:t>
+            </a:r>
           </a:p>
           <a:p>
             <a:pPr marL="914400" lvl="1" indent="-317500" algn="l" rtl="0">
@@ -5341,232 +5713,54 @@
               <a:buChar char="○"/>
             </a:pPr>
             <a:r>
-              <a:rPr lang="pt-BR" dirty="0">
-                <a:latin typeface="Roboto" panose="02000000000000000000" pitchFamily="2" charset="0"/>
-                <a:ea typeface="Roboto" panose="02000000000000000000" pitchFamily="2" charset="0"/>
-              </a:rPr>
-              <a:t>Info;</a:t>
-            </a:r>
-          </a:p>
-          <a:p>
-            <a:pPr marL="914400" lvl="1" indent="-317500" algn="l" rtl="0">
+              <a:rPr lang="pt-BR" dirty="0"/>
+              <a:t>Utilizado principalmente para expor informações operacionais sobre a aplicação em execução. Como por exemplo:</a:t>
+            </a:r>
+          </a:p>
+          <a:p>
+            <a:pPr lvl="2">
               <a:lnSpc>
                 <a:spcPct val="150000"/>
               </a:lnSpc>
-              <a:spcBef>
-                <a:spcPts val="0"/>
-              </a:spcBef>
-              <a:spcAft>
-                <a:spcPts val="0"/>
-              </a:spcAft>
-              <a:buSzPts val="1400"/>
               <a:buChar char="○"/>
             </a:pPr>
             <a:r>
-              <a:rPr lang="pt-BR" dirty="0">
-                <a:latin typeface="Roboto" panose="02000000000000000000" pitchFamily="2" charset="0"/>
-                <a:ea typeface="Roboto" panose="02000000000000000000" pitchFamily="2" charset="0"/>
-              </a:rPr>
-              <a:t>Health;</a:t>
-            </a:r>
-          </a:p>
-          <a:p>
-            <a:pPr marL="914400" lvl="1" indent="-317500" algn="l" rtl="0">
+              <a:rPr lang="pt-BR" dirty="0" err="1"/>
+              <a:t>health</a:t>
+            </a:r>
+            <a:r>
+              <a:rPr lang="pt-BR" dirty="0"/>
+              <a:t>, </a:t>
+            </a:r>
+            <a:r>
+              <a:rPr lang="pt-BR" dirty="0" err="1"/>
+              <a:t>metrics</a:t>
+            </a:r>
+            <a:r>
+              <a:rPr lang="pt-BR" dirty="0"/>
+              <a:t>, </a:t>
+            </a:r>
+            <a:r>
+              <a:rPr lang="pt-BR" dirty="0" err="1"/>
+              <a:t>info</a:t>
+            </a:r>
+            <a:r>
+              <a:rPr lang="pt-BR" dirty="0"/>
+              <a:t>, etc...</a:t>
+            </a:r>
+          </a:p>
+          <a:p>
+            <a:pPr lvl="2">
               <a:lnSpc>
                 <a:spcPct val="150000"/>
               </a:lnSpc>
-              <a:spcBef>
-                <a:spcPts val="0"/>
-              </a:spcBef>
-              <a:spcAft>
-                <a:spcPts val="0"/>
-              </a:spcAft>
-              <a:buSzPts val="1400"/>
               <a:buChar char="○"/>
             </a:pPr>
-            <a:r>
-              <a:rPr lang="pt-BR" dirty="0" err="1">
-                <a:latin typeface="Roboto" panose="02000000000000000000" pitchFamily="2" charset="0"/>
-                <a:ea typeface="Roboto" panose="02000000000000000000" pitchFamily="2" charset="0"/>
-              </a:rPr>
-              <a:t>Metrics</a:t>
-            </a:r>
-            <a:r>
-              <a:rPr lang="pt-BR" dirty="0">
-                <a:latin typeface="Roboto" panose="02000000000000000000" pitchFamily="2" charset="0"/>
-                <a:ea typeface="Roboto" panose="02000000000000000000" pitchFamily="2" charset="0"/>
-              </a:rPr>
-              <a:t>;</a:t>
-            </a:r>
-          </a:p>
-          <a:p>
-            <a:pPr marL="914400" lvl="1" indent="-317500" algn="l" rtl="0">
-              <a:lnSpc>
-                <a:spcPct val="150000"/>
-              </a:lnSpc>
-              <a:spcBef>
-                <a:spcPts val="0"/>
-              </a:spcBef>
-              <a:spcAft>
-                <a:spcPts val="0"/>
-              </a:spcAft>
-              <a:buSzPts val="1400"/>
-              <a:buChar char="○"/>
-            </a:pPr>
-            <a:r>
-              <a:rPr lang="pt-BR" dirty="0">
-                <a:latin typeface="Roboto" panose="02000000000000000000" pitchFamily="2" charset="0"/>
-                <a:ea typeface="Roboto" panose="02000000000000000000" pitchFamily="2" charset="0"/>
-              </a:rPr>
-              <a:t>Mappings;</a:t>
-            </a:r>
-          </a:p>
-          <a:p>
-            <a:pPr marL="914400" lvl="1" indent="-317500" algn="l" rtl="0">
-              <a:lnSpc>
-                <a:spcPct val="150000"/>
-              </a:lnSpc>
-              <a:spcBef>
-                <a:spcPts val="0"/>
-              </a:spcBef>
-              <a:spcAft>
-                <a:spcPts val="0"/>
-              </a:spcAft>
-              <a:buSzPts val="1400"/>
-              <a:buChar char="○"/>
-            </a:pPr>
-            <a:r>
-              <a:rPr lang="pt-BR" dirty="0" err="1">
-                <a:latin typeface="Roboto" panose="02000000000000000000" pitchFamily="2" charset="0"/>
-                <a:ea typeface="Roboto" panose="02000000000000000000" pitchFamily="2" charset="0"/>
-              </a:rPr>
-              <a:t>Httptrace</a:t>
-            </a:r>
-            <a:r>
-              <a:rPr lang="pt-BR" dirty="0">
-                <a:latin typeface="Roboto" panose="02000000000000000000" pitchFamily="2" charset="0"/>
-                <a:ea typeface="Roboto" panose="02000000000000000000" pitchFamily="2" charset="0"/>
-              </a:rPr>
-              <a:t>;</a:t>
-            </a:r>
-          </a:p>
-          <a:p>
-            <a:pPr marL="914400" lvl="1" indent="-317500" algn="l" rtl="0">
-              <a:lnSpc>
-                <a:spcPct val="150000"/>
-              </a:lnSpc>
-              <a:spcBef>
-                <a:spcPts val="0"/>
-              </a:spcBef>
-              <a:spcAft>
-                <a:spcPts val="0"/>
-              </a:spcAft>
-              <a:buSzPts val="1400"/>
-              <a:buChar char="○"/>
-            </a:pPr>
-            <a:r>
-              <a:rPr lang="pt-BR" dirty="0" err="1">
-                <a:latin typeface="Roboto" panose="02000000000000000000" pitchFamily="2" charset="0"/>
-                <a:ea typeface="Roboto" panose="02000000000000000000" pitchFamily="2" charset="0"/>
-              </a:rPr>
-              <a:t>Auditevents</a:t>
-            </a:r>
-            <a:r>
-              <a:rPr lang="pt-BR" dirty="0">
-                <a:latin typeface="Roboto" panose="02000000000000000000" pitchFamily="2" charset="0"/>
-                <a:ea typeface="Roboto" panose="02000000000000000000" pitchFamily="2" charset="0"/>
-              </a:rPr>
-              <a:t>;</a:t>
-            </a:r>
-          </a:p>
-          <a:p>
-            <a:pPr marL="914400" lvl="1" indent="-317500" algn="l" rtl="0">
-              <a:lnSpc>
-                <a:spcPct val="150000"/>
-              </a:lnSpc>
-              <a:spcBef>
-                <a:spcPts val="0"/>
-              </a:spcBef>
-              <a:spcAft>
-                <a:spcPts val="0"/>
-              </a:spcAft>
-              <a:buSzPts val="1400"/>
-              <a:buChar char="○"/>
-            </a:pPr>
-            <a:r>
-              <a:rPr lang="pt-BR" dirty="0" err="1">
-                <a:latin typeface="Roboto" panose="02000000000000000000" pitchFamily="2" charset="0"/>
-                <a:ea typeface="Roboto" panose="02000000000000000000" pitchFamily="2" charset="0"/>
-              </a:rPr>
-              <a:t>Env</a:t>
-            </a:r>
-            <a:r>
-              <a:rPr lang="pt-BR" dirty="0">
-                <a:latin typeface="Roboto" panose="02000000000000000000" pitchFamily="2" charset="0"/>
-                <a:ea typeface="Roboto" panose="02000000000000000000" pitchFamily="2" charset="0"/>
-              </a:rPr>
-              <a:t>;</a:t>
-            </a:r>
-          </a:p>
-          <a:p>
-            <a:pPr marL="914400" lvl="1" indent="-317500" algn="l" rtl="0">
-              <a:lnSpc>
-                <a:spcPct val="150000"/>
-              </a:lnSpc>
-              <a:spcBef>
-                <a:spcPts val="0"/>
-              </a:spcBef>
-              <a:spcAft>
-                <a:spcPts val="0"/>
-              </a:spcAft>
-              <a:buSzPts val="1400"/>
-              <a:buChar char="○"/>
-            </a:pPr>
-            <a:r>
-              <a:rPr lang="pt-BR" dirty="0" err="1">
-                <a:latin typeface="Roboto" panose="02000000000000000000" pitchFamily="2" charset="0"/>
-                <a:ea typeface="Roboto" panose="02000000000000000000" pitchFamily="2" charset="0"/>
-              </a:rPr>
-              <a:t>Scheduledtasks</a:t>
-            </a:r>
-            <a:r>
-              <a:rPr lang="pt-BR" dirty="0">
-                <a:latin typeface="Roboto" panose="02000000000000000000" pitchFamily="2" charset="0"/>
-                <a:ea typeface="Roboto" panose="02000000000000000000" pitchFamily="2" charset="0"/>
-              </a:rPr>
-              <a:t>;</a:t>
-            </a:r>
-          </a:p>
-          <a:p>
-            <a:pPr marL="914400" lvl="1" indent="-317500" algn="l" rtl="0">
-              <a:lnSpc>
-                <a:spcPct val="150000"/>
-              </a:lnSpc>
-              <a:spcBef>
-                <a:spcPts val="0"/>
-              </a:spcBef>
-              <a:spcAft>
-                <a:spcPts val="0"/>
-              </a:spcAft>
-              <a:buSzPts val="1400"/>
-              <a:buChar char="○"/>
-            </a:pPr>
-            <a:r>
-              <a:rPr lang="pt-BR" dirty="0">
-                <a:latin typeface="Roboto" panose="02000000000000000000" pitchFamily="2" charset="0"/>
-                <a:ea typeface="Roboto" panose="02000000000000000000" pitchFamily="2" charset="0"/>
-              </a:rPr>
-              <a:t>Caches;</a:t>
-            </a:r>
+            <a:endParaRPr lang="pt-BR" dirty="0"/>
           </a:p>
         </p:txBody>
       </p:sp>
     </p:spTree>
-    <p:extLst>
-      <p:ext uri="{BB962C8B-B14F-4D97-AF65-F5344CB8AC3E}">
-        <p14:creationId xmlns:p14="http://schemas.microsoft.com/office/powerpoint/2010/main" val="138095429"/>
-      </p:ext>
-    </p:extLst>
   </p:cSld>
   <p:clrMapOvr>
     <a:masterClrMapping/>
@@ -5626,10 +5820,14 @@
               <a:buNone/>
             </a:pPr>
             <a:r>
-              <a:rPr lang="pt-BR"/>
-              <a:t>Requisitos, ambiente e recursos</a:t>
-            </a:r>
-            <a:endParaRPr/>
+              <a:rPr lang="pt-BR" dirty="0"/>
+              <a:t>Spring Boot </a:t>
+            </a:r>
+            <a:r>
+              <a:rPr lang="pt-BR" dirty="0" err="1"/>
+              <a:t>Actuator</a:t>
+            </a:r>
+            <a:endParaRPr dirty="0"/>
           </a:p>
         </p:txBody>
       </p:sp>
@@ -5673,122 +5871,84 @@
             </a:pPr>
             <a:r>
               <a:rPr lang="pt-BR" dirty="0"/>
-              <a:t>Ambiente e recursos necessários:</a:t>
+              <a:t>Como importar o Spring </a:t>
+            </a:r>
+            <a:r>
+              <a:rPr lang="pt-BR" dirty="0" err="1"/>
+              <a:t>Actuator</a:t>
+            </a:r>
+            <a:r>
+              <a:rPr lang="pt-BR" dirty="0"/>
+              <a:t> para o nosso projeto?</a:t>
             </a:r>
             <a:endParaRPr dirty="0"/>
-          </a:p>
-          <a:p>
-            <a:pPr marL="914400" lvl="1" indent="-317500" algn="l" rtl="0">
-              <a:lnSpc>
-                <a:spcPct val="150000"/>
-              </a:lnSpc>
-              <a:spcBef>
-                <a:spcPts val="0"/>
-              </a:spcBef>
-              <a:spcAft>
-                <a:spcPts val="0"/>
-              </a:spcAft>
-              <a:buSzPts val="1400"/>
-              <a:buChar char="○"/>
-            </a:pPr>
-            <a:r>
-              <a:rPr lang="pt-BR" dirty="0"/>
-              <a:t>Java 8+</a:t>
-            </a:r>
-            <a:r>
-              <a:rPr lang="pt-BR" sz="1400" dirty="0"/>
-              <a:t>;</a:t>
-            </a:r>
-          </a:p>
-          <a:p>
-            <a:pPr marL="914400" lvl="1" indent="-317500" algn="l" rtl="0">
-              <a:lnSpc>
-                <a:spcPct val="150000"/>
-              </a:lnSpc>
-              <a:spcBef>
-                <a:spcPts val="0"/>
-              </a:spcBef>
-              <a:spcAft>
-                <a:spcPts val="0"/>
-              </a:spcAft>
-              <a:buSzPts val="1400"/>
-              <a:buChar char="○"/>
-            </a:pPr>
-            <a:r>
-              <a:rPr lang="pt-BR" dirty="0"/>
-              <a:t>H2 </a:t>
-            </a:r>
-            <a:r>
-              <a:rPr lang="pt-BR" dirty="0" err="1"/>
-              <a:t>Database</a:t>
-            </a:r>
-            <a:r>
-              <a:rPr lang="pt-BR" dirty="0"/>
-              <a:t>;</a:t>
-            </a:r>
-            <a:endParaRPr lang="pt-BR" sz="1400" dirty="0"/>
-          </a:p>
-          <a:p>
-            <a:pPr marL="914400" lvl="1" indent="-317500" algn="l" rtl="0">
-              <a:lnSpc>
-                <a:spcPct val="150000"/>
-              </a:lnSpc>
-              <a:spcBef>
-                <a:spcPts val="0"/>
-              </a:spcBef>
-              <a:spcAft>
-                <a:spcPts val="0"/>
-              </a:spcAft>
-              <a:buSzPts val="1400"/>
-              <a:buChar char="○"/>
-            </a:pPr>
-            <a:r>
-              <a:rPr lang="pt-BR"/>
-              <a:t>Seu </a:t>
-            </a:r>
-            <a:r>
-              <a:rPr lang="pt-BR" dirty="0"/>
-              <a:t>editor de código de preferência (No meu caso, </a:t>
-            </a:r>
-            <a:r>
-              <a:rPr lang="pt-BR" dirty="0" err="1"/>
-              <a:t>Intellij</a:t>
-            </a:r>
-            <a:r>
-              <a:rPr lang="pt-BR" dirty="0"/>
-              <a:t>)</a:t>
-            </a:r>
-            <a:r>
-              <a:rPr lang="pt-BR" sz="1400" dirty="0"/>
-              <a:t>;</a:t>
-            </a:r>
-            <a:endParaRPr sz="1400" dirty="0"/>
-          </a:p>
-          <a:p>
-            <a:pPr marL="914400" lvl="1" indent="-317500" algn="l" rtl="0">
-              <a:lnSpc>
-                <a:spcPct val="150000"/>
-              </a:lnSpc>
-              <a:spcBef>
-                <a:spcPts val="0"/>
-              </a:spcBef>
-              <a:spcAft>
-                <a:spcPts val="0"/>
-              </a:spcAft>
-              <a:buSzPts val="1400"/>
-              <a:buChar char="○"/>
-            </a:pPr>
-            <a:r>
-              <a:rPr lang="pt-BR" dirty="0"/>
-              <a:t>Vontade de aprender :D</a:t>
-            </a:r>
           </a:p>
         </p:txBody>
       </p:sp>
+      <p:pic>
+        <p:nvPicPr>
+          <p:cNvPr id="5" name="Imagem 4">
+            <a:extLst>
+              <a:ext uri="{FF2B5EF4-FFF2-40B4-BE49-F238E27FC236}">
+                <a16:creationId xmlns:a16="http://schemas.microsoft.com/office/drawing/2014/main" id="{49E5786F-C424-4BA9-B67A-F02A64B4DEA0}"/>
+              </a:ext>
+            </a:extLst>
+          </p:cNvPr>
+          <p:cNvPicPr>
+            <a:picLocks noChangeAspect="1"/>
+          </p:cNvPicPr>
+          <p:nvPr/>
+        </p:nvPicPr>
+        <p:blipFill>
+          <a:blip r:embed="rId3"/>
+          <a:stretch>
+            <a:fillRect/>
+          </a:stretch>
+        </p:blipFill>
+        <p:spPr>
+          <a:xfrm>
+            <a:off x="495860" y="1708150"/>
+            <a:ext cx="3943350" cy="1000125"/>
+          </a:xfrm>
+          <a:prstGeom prst="rect">
+            <a:avLst/>
+          </a:prstGeom>
+        </p:spPr>
+      </p:pic>
+      <p:pic>
+        <p:nvPicPr>
+          <p:cNvPr id="7" name="Imagem 6">
+            <a:extLst>
+              <a:ext uri="{FF2B5EF4-FFF2-40B4-BE49-F238E27FC236}">
+                <a16:creationId xmlns:a16="http://schemas.microsoft.com/office/drawing/2014/main" id="{B567DDE1-B817-4367-8E1A-7B338BB72910}"/>
+              </a:ext>
+            </a:extLst>
+          </p:cNvPr>
+          <p:cNvPicPr>
+            <a:picLocks noChangeAspect="1"/>
+          </p:cNvPicPr>
+          <p:nvPr/>
+        </p:nvPicPr>
+        <p:blipFill>
+          <a:blip r:embed="rId4"/>
+          <a:stretch>
+            <a:fillRect/>
+          </a:stretch>
+        </p:blipFill>
+        <p:spPr>
+          <a:xfrm>
+            <a:off x="500165" y="3076600"/>
+            <a:ext cx="5105400" cy="971550"/>
+          </a:xfrm>
+          <a:prstGeom prst="rect">
+            <a:avLst/>
+          </a:prstGeom>
+        </p:spPr>
+      </p:pic>
     </p:spTree>
     <p:extLst>
       <p:ext uri="{BB962C8B-B14F-4D97-AF65-F5344CB8AC3E}">
-        <p14:creationId xmlns:p14="http://schemas.microsoft.com/office/powerpoint/2010/main" val="2166939777"/>
+        <p14:creationId xmlns:p14="http://schemas.microsoft.com/office/powerpoint/2010/main" val="158812201"/>
       </p:ext>
     </p:extLst>
   </p:cSld>
@@ -5803,7 +5963,7 @@
   <p:cSld>
     <p:spTree>
       <p:nvGrpSpPr>
-        <p:cNvPr id="1" name="Shape 69"/>
+        <p:cNvPr id="1" name="Shape 57"/>
         <p:cNvGrpSpPr/>
         <p:nvPr/>
       </p:nvGrpSpPr>
@@ -5817,26 +5977,26 @@
       </p:grpSpPr>
       <p:sp>
         <p:nvSpPr>
-          <p:cNvPr id="70" name="Google Shape;70;p12"/>
+          <p:cNvPr id="58" name="Google Shape;58;p10"/>
           <p:cNvSpPr txBox="1">
             <a:spLocks noGrp="1"/>
           </p:cNvSpPr>
           <p:nvPr>
-            <p:ph type="ctrTitle"/>
+            <p:ph type="title"/>
           </p:nvPr>
         </p:nvSpPr>
         <p:spPr>
           <a:xfrm>
-            <a:off x="311706" y="1537300"/>
-            <a:ext cx="6451500" cy="985200"/>
+            <a:off x="311700" y="292625"/>
+            <a:ext cx="8520600" cy="572700"/>
           </a:xfrm>
           <a:prstGeom prst="rect">
             <a:avLst/>
           </a:prstGeom>
         </p:spPr>
         <p:txBody>
-          <a:bodyPr spcFirstLastPara="1" wrap="square" lIns="91425" tIns="91425" rIns="91425" bIns="91425" anchor="ctr" anchorCtr="0">
-            <a:spAutoFit/>
+          <a:bodyPr spcFirstLastPara="1" wrap="square" lIns="91425" tIns="91425" rIns="91425" bIns="91425" anchor="t" anchorCtr="0">
+            <a:normAutofit fontScale="90000"/>
           </a:bodyPr>
           <a:lstStyle/>
           <a:p>
@@ -5850,49 +6010,45 @@
               <a:buNone/>
             </a:pPr>
             <a:r>
-              <a:rPr lang="pt-BR" dirty="0">
-                <a:solidFill>
-                  <a:srgbClr val="D8A853"/>
-                </a:solidFill>
-              </a:rPr>
-              <a:t>Obrigado!</a:t>
-            </a:r>
-            <a:endParaRPr dirty="0">
-              <a:solidFill>
-                <a:srgbClr val="D8A853"/>
-              </a:solidFill>
-            </a:endParaRPr>
+              <a:rPr lang="pt-BR" dirty="0"/>
+              <a:t>Spring Boot </a:t>
+            </a:r>
+            <a:r>
+              <a:rPr lang="pt-BR" dirty="0" err="1"/>
+              <a:t>Actuator</a:t>
+            </a:r>
+            <a:endParaRPr dirty="0"/>
           </a:p>
         </p:txBody>
       </p:sp>
       <p:sp>
         <p:nvSpPr>
-          <p:cNvPr id="71" name="Google Shape;71;p12"/>
+          <p:cNvPr id="59" name="Google Shape;59;p10"/>
           <p:cNvSpPr txBox="1">
             <a:spLocks noGrp="1"/>
           </p:cNvSpPr>
           <p:nvPr>
-            <p:ph type="subTitle" idx="1"/>
+            <p:ph type="body" idx="1"/>
           </p:nvPr>
         </p:nvSpPr>
         <p:spPr>
           <a:xfrm>
-            <a:off x="311700" y="2765275"/>
-            <a:ext cx="6451500" cy="1954351"/>
+            <a:off x="311700" y="865325"/>
+            <a:ext cx="6405106" cy="4029125"/>
           </a:xfrm>
           <a:prstGeom prst="rect">
             <a:avLst/>
           </a:prstGeom>
         </p:spPr>
         <p:txBody>
-          <a:bodyPr spcFirstLastPara="1" wrap="square" lIns="91425" tIns="91425" rIns="91425" bIns="91425" anchor="ctr" anchorCtr="0">
-            <a:spAutoFit/>
+          <a:bodyPr spcFirstLastPara="1" wrap="square" lIns="91425" tIns="91425" rIns="91425" bIns="91425" anchor="t" anchorCtr="0">
+            <a:normAutofit/>
           </a:bodyPr>
           <a:lstStyle/>
           <a:p>
-            <a:pPr marL="0" lvl="0" indent="0" algn="l" rtl="0">
+            <a:pPr marL="457200" lvl="0" indent="-342900" algn="l" rtl="0">
               <a:lnSpc>
-                <a:spcPct val="115000"/>
+                <a:spcPct val="150000"/>
               </a:lnSpc>
               <a:spcBef>
                 <a:spcPts val="0"/>
@@ -5900,48 +6056,68 @@
               <a:spcAft>
                 <a:spcPts val="0"/>
               </a:spcAft>
-              <a:buNone/>
+              <a:buSzPts val="1800"/>
+              <a:buChar char="●"/>
             </a:pPr>
             <a:r>
-              <a:rPr lang="pt-BR" b="1" dirty="0">
-                <a:solidFill>
-                  <a:schemeClr val="lt1"/>
-                </a:solidFill>
-                <a:latin typeface="Roboto"/>
-                <a:ea typeface="Roboto"/>
-                <a:cs typeface="Roboto"/>
-                <a:sym typeface="Roboto"/>
+              <a:rPr lang="pt-BR" dirty="0"/>
+              <a:t>Alguns dos </a:t>
+            </a:r>
+            <a:r>
+              <a:rPr lang="pt-BR" dirty="0" err="1"/>
+              <a:t>endpoints</a:t>
+            </a:r>
+            <a:r>
+              <a:rPr lang="pt-BR" dirty="0"/>
+              <a:t> disponíveis pelo </a:t>
+            </a:r>
+            <a:r>
+              <a:rPr lang="pt-BR" dirty="0" err="1"/>
+              <a:t>Actuator</a:t>
+            </a:r>
+            <a:r>
+              <a:rPr lang="pt-BR" dirty="0"/>
+              <a:t>:</a:t>
+            </a:r>
+            <a:endParaRPr dirty="0"/>
+          </a:p>
+          <a:p>
+            <a:pPr marL="914400" lvl="1" indent="-317500" algn="l" rtl="0">
+              <a:lnSpc>
+                <a:spcPct val="150000"/>
+              </a:lnSpc>
+              <a:spcBef>
+                <a:spcPts val="0"/>
+              </a:spcBef>
+              <a:spcAft>
+                <a:spcPts val="0"/>
+              </a:spcAft>
+              <a:buSzPts val="1400"/>
+              <a:buChar char="○"/>
+            </a:pPr>
+            <a:r>
+              <a:rPr lang="pt-BR" dirty="0" err="1">
+                <a:latin typeface="Roboto" panose="02000000000000000000" pitchFamily="2" charset="0"/>
+                <a:ea typeface="Roboto" panose="02000000000000000000" pitchFamily="2" charset="0"/>
               </a:rPr>
-              <a:t>Pedro Henrique Lacombe </a:t>
+              <a:t>Actuator</a:t>
             </a:r>
             <a:r>
               <a:rPr lang="pt-BR" dirty="0">
-                <a:solidFill>
-                  <a:schemeClr val="lt1"/>
-                </a:solidFill>
-                <a:uFill>
-                  <a:noFill/>
-                </a:uFill>
-                <a:hlinkClick r:id="rId3">
-                  <a:extLst>
-                    <a:ext uri="{A12FA001-AC4F-418D-AE19-62706E023703}">
-                      <ahyp:hlinkClr xmlns:ahyp="http://schemas.microsoft.com/office/drawing/2018/hyperlinkcolor" val="tx"/>
-                    </a:ext>
-                  </a:extLst>
-                </a:hlinkClick>
+                <a:latin typeface="Roboto" panose="02000000000000000000" pitchFamily="2" charset="0"/>
+                <a:ea typeface="Roboto" panose="02000000000000000000" pitchFamily="2" charset="0"/>
               </a:rPr>
-              <a:t>pedrohenriquelacombe@gmail.com</a:t>
+              <a:t>; (default)</a:t>
             </a:r>
             <a:endParaRPr dirty="0">
-              <a:solidFill>
-                <a:schemeClr val="lt1"/>
-              </a:solidFill>
+              <a:latin typeface="Roboto" panose="02000000000000000000" pitchFamily="2" charset="0"/>
+              <a:ea typeface="Roboto" panose="02000000000000000000" pitchFamily="2" charset="0"/>
             </a:endParaRPr>
           </a:p>
           <a:p>
-            <a:pPr marL="0" lvl="0" indent="0" algn="l" rtl="0">
+            <a:pPr marL="914400" lvl="1" indent="-317500" algn="l" rtl="0">
               <a:lnSpc>
-                <a:spcPct val="115000"/>
+                <a:spcPct val="150000"/>
               </a:lnSpc>
               <a:spcBef>
                 <a:spcPts val="0"/>
@@ -5949,21 +6125,21 @@
               <a:spcAft>
                 <a:spcPts val="0"/>
               </a:spcAft>
-              <a:buNone/>
+              <a:buSzPts val="1400"/>
+              <a:buChar char="○"/>
             </a:pPr>
             <a:r>
               <a:rPr lang="pt-BR" dirty="0">
-                <a:solidFill>
-                  <a:schemeClr val="lt1"/>
-                </a:solidFill>
+                <a:latin typeface="Roboto" panose="02000000000000000000" pitchFamily="2" charset="0"/>
+                <a:ea typeface="Roboto" panose="02000000000000000000" pitchFamily="2" charset="0"/>
               </a:rPr>
-              <a:t>Redes sociais: </a:t>
-            </a:r>
-          </a:p>
-          <a:p>
-            <a:pPr marL="0" lvl="0" indent="0" algn="l" rtl="0">
+              <a:t>Info; (default)</a:t>
+            </a:r>
+          </a:p>
+          <a:p>
+            <a:pPr marL="914400" lvl="1" indent="-317500" algn="l" rtl="0">
               <a:lnSpc>
-                <a:spcPct val="115000"/>
+                <a:spcPct val="150000"/>
               </a:lnSpc>
               <a:spcBef>
                 <a:spcPts val="0"/>
@@ -5971,20 +6147,21 @@
               <a:spcAft>
                 <a:spcPts val="0"/>
               </a:spcAft>
-              <a:buNone/>
+              <a:buSzPts val="1400"/>
+              <a:buChar char="○"/>
             </a:pPr>
             <a:r>
               <a:rPr lang="pt-BR" dirty="0">
-                <a:hlinkClick r:id="rId4"/>
+                <a:latin typeface="Roboto" panose="02000000000000000000" pitchFamily="2" charset="0"/>
+                <a:ea typeface="Roboto" panose="02000000000000000000" pitchFamily="2" charset="0"/>
               </a:rPr>
-              <a:t>https://github.com/PedroLacombe</a:t>
-            </a:r>
-            <a:endParaRPr lang="pt-BR" dirty="0"/>
-          </a:p>
-          <a:p>
-            <a:pPr marL="0" lvl="0" indent="0" algn="l" rtl="0">
+              <a:t>Health; (default)</a:t>
+            </a:r>
+          </a:p>
+          <a:p>
+            <a:pPr marL="914400" lvl="1" indent="-317500" algn="l" rtl="0">
               <a:lnSpc>
-                <a:spcPct val="115000"/>
+                <a:spcPct val="150000"/>
               </a:lnSpc>
               <a:spcBef>
                 <a:spcPts val="0"/>
@@ -5992,23 +6169,384 @@
               <a:spcAft>
                 <a:spcPts val="0"/>
               </a:spcAft>
-              <a:buNone/>
+              <a:buSzPts val="1400"/>
+              <a:buChar char="○"/>
             </a:pPr>
             <a:r>
+              <a:rPr lang="pt-BR" dirty="0" err="1">
+                <a:latin typeface="Roboto" panose="02000000000000000000" pitchFamily="2" charset="0"/>
+                <a:ea typeface="Roboto" panose="02000000000000000000" pitchFamily="2" charset="0"/>
+              </a:rPr>
+              <a:t>Metrics</a:t>
+            </a:r>
+            <a:r>
               <a:rPr lang="pt-BR" dirty="0">
-                <a:hlinkClick r:id="rId5"/>
+                <a:latin typeface="Roboto" panose="02000000000000000000" pitchFamily="2" charset="0"/>
+                <a:ea typeface="Roboto" panose="02000000000000000000" pitchFamily="2" charset="0"/>
               </a:rPr>
-              <a:t>https://www.linkedin.com/in/pedrohenriquelacombe</a:t>
-            </a:r>
-            <a:endParaRPr lang="pt-BR" dirty="0">
-              <a:solidFill>
-                <a:schemeClr val="lt1"/>
-              </a:solidFill>
-            </a:endParaRPr>
+              <a:t>;</a:t>
+            </a:r>
+          </a:p>
+          <a:p>
+            <a:pPr marL="914400" lvl="1" indent="-317500" algn="l" rtl="0">
+              <a:lnSpc>
+                <a:spcPct val="150000"/>
+              </a:lnSpc>
+              <a:spcBef>
+                <a:spcPts val="0"/>
+              </a:spcBef>
+              <a:spcAft>
+                <a:spcPts val="0"/>
+              </a:spcAft>
+              <a:buSzPts val="1400"/>
+              <a:buChar char="○"/>
+            </a:pPr>
+            <a:r>
+              <a:rPr lang="pt-BR" dirty="0">
+                <a:latin typeface="Roboto" panose="02000000000000000000" pitchFamily="2" charset="0"/>
+                <a:ea typeface="Roboto" panose="02000000000000000000" pitchFamily="2" charset="0"/>
+              </a:rPr>
+              <a:t>Mappings;</a:t>
+            </a:r>
+          </a:p>
+          <a:p>
+            <a:pPr marL="914400" lvl="1" indent="-317500" algn="l" rtl="0">
+              <a:lnSpc>
+                <a:spcPct val="150000"/>
+              </a:lnSpc>
+              <a:spcBef>
+                <a:spcPts val="0"/>
+              </a:spcBef>
+              <a:spcAft>
+                <a:spcPts val="0"/>
+              </a:spcAft>
+              <a:buSzPts val="1400"/>
+              <a:buChar char="○"/>
+            </a:pPr>
+            <a:r>
+              <a:rPr lang="pt-BR" dirty="0" err="1">
+                <a:latin typeface="Roboto" panose="02000000000000000000" pitchFamily="2" charset="0"/>
+                <a:ea typeface="Roboto" panose="02000000000000000000" pitchFamily="2" charset="0"/>
+              </a:rPr>
+              <a:t>Httptrace</a:t>
+            </a:r>
+            <a:r>
+              <a:rPr lang="pt-BR" dirty="0">
+                <a:latin typeface="Roboto" panose="02000000000000000000" pitchFamily="2" charset="0"/>
+                <a:ea typeface="Roboto" panose="02000000000000000000" pitchFamily="2" charset="0"/>
+              </a:rPr>
+              <a:t>;</a:t>
+            </a:r>
+          </a:p>
+          <a:p>
+            <a:pPr marL="914400" lvl="1" indent="-317500" algn="l" rtl="0">
+              <a:lnSpc>
+                <a:spcPct val="150000"/>
+              </a:lnSpc>
+              <a:spcBef>
+                <a:spcPts val="0"/>
+              </a:spcBef>
+              <a:spcAft>
+                <a:spcPts val="0"/>
+              </a:spcAft>
+              <a:buSzPts val="1400"/>
+              <a:buChar char="○"/>
+            </a:pPr>
+            <a:r>
+              <a:rPr lang="pt-BR" dirty="0" err="1">
+                <a:latin typeface="Roboto" panose="02000000000000000000" pitchFamily="2" charset="0"/>
+                <a:ea typeface="Roboto" panose="02000000000000000000" pitchFamily="2" charset="0"/>
+              </a:rPr>
+              <a:t>Auditevents</a:t>
+            </a:r>
+            <a:r>
+              <a:rPr lang="pt-BR" dirty="0">
+                <a:latin typeface="Roboto" panose="02000000000000000000" pitchFamily="2" charset="0"/>
+                <a:ea typeface="Roboto" panose="02000000000000000000" pitchFamily="2" charset="0"/>
+              </a:rPr>
+              <a:t>;</a:t>
+            </a:r>
+          </a:p>
+          <a:p>
+            <a:pPr marL="914400" lvl="1" indent="-317500" algn="l" rtl="0">
+              <a:lnSpc>
+                <a:spcPct val="150000"/>
+              </a:lnSpc>
+              <a:spcBef>
+                <a:spcPts val="0"/>
+              </a:spcBef>
+              <a:spcAft>
+                <a:spcPts val="0"/>
+              </a:spcAft>
+              <a:buSzPts val="1400"/>
+              <a:buChar char="○"/>
+            </a:pPr>
+            <a:r>
+              <a:rPr lang="pt-BR" dirty="0" err="1">
+                <a:latin typeface="Roboto" panose="02000000000000000000" pitchFamily="2" charset="0"/>
+                <a:ea typeface="Roboto" panose="02000000000000000000" pitchFamily="2" charset="0"/>
+              </a:rPr>
+              <a:t>Env</a:t>
+            </a:r>
+            <a:r>
+              <a:rPr lang="pt-BR" dirty="0">
+                <a:latin typeface="Roboto" panose="02000000000000000000" pitchFamily="2" charset="0"/>
+                <a:ea typeface="Roboto" panose="02000000000000000000" pitchFamily="2" charset="0"/>
+              </a:rPr>
+              <a:t>;</a:t>
+            </a:r>
+          </a:p>
+          <a:p>
+            <a:pPr marL="914400" lvl="1" indent="-317500" algn="l" rtl="0">
+              <a:lnSpc>
+                <a:spcPct val="150000"/>
+              </a:lnSpc>
+              <a:spcBef>
+                <a:spcPts val="0"/>
+              </a:spcBef>
+              <a:spcAft>
+                <a:spcPts val="0"/>
+              </a:spcAft>
+              <a:buSzPts val="1400"/>
+              <a:buChar char="○"/>
+            </a:pPr>
+            <a:r>
+              <a:rPr lang="pt-BR" dirty="0" err="1">
+                <a:latin typeface="Roboto" panose="02000000000000000000" pitchFamily="2" charset="0"/>
+                <a:ea typeface="Roboto" panose="02000000000000000000" pitchFamily="2" charset="0"/>
+              </a:rPr>
+              <a:t>Scheduledtasks</a:t>
+            </a:r>
+            <a:r>
+              <a:rPr lang="pt-BR" dirty="0">
+                <a:latin typeface="Roboto" panose="02000000000000000000" pitchFamily="2" charset="0"/>
+                <a:ea typeface="Roboto" panose="02000000000000000000" pitchFamily="2" charset="0"/>
+              </a:rPr>
+              <a:t>;</a:t>
+            </a:r>
+          </a:p>
+          <a:p>
+            <a:pPr marL="914400" lvl="1" indent="-317500" algn="l" rtl="0">
+              <a:lnSpc>
+                <a:spcPct val="150000"/>
+              </a:lnSpc>
+              <a:spcBef>
+                <a:spcPts val="0"/>
+              </a:spcBef>
+              <a:spcAft>
+                <a:spcPts val="0"/>
+              </a:spcAft>
+              <a:buSzPts val="1400"/>
+              <a:buChar char="○"/>
+            </a:pPr>
+            <a:r>
+              <a:rPr lang="pt-BR" dirty="0">
+                <a:latin typeface="Roboto" panose="02000000000000000000" pitchFamily="2" charset="0"/>
+                <a:ea typeface="Roboto" panose="02000000000000000000" pitchFamily="2" charset="0"/>
+              </a:rPr>
+              <a:t>Caches;</a:t>
+            </a:r>
           </a:p>
         </p:txBody>
       </p:sp>
     </p:spTree>
+    <p:extLst>
+      <p:ext uri="{BB962C8B-B14F-4D97-AF65-F5344CB8AC3E}">
+        <p14:creationId xmlns:p14="http://schemas.microsoft.com/office/powerpoint/2010/main" val="138095429"/>
+      </p:ext>
+    </p:extLst>
+  </p:cSld>
+  <p:clrMapOvr>
+    <a:masterClrMapping/>
+  </p:clrMapOvr>
+</p:sld>
+</file>
+
+<file path=ppt/slides/slide9.xml><?xml version="1.0" encoding="utf-8"?>
+<p:sld xmlns:a="http://schemas.openxmlformats.org/drawingml/2006/main" xmlns:r="http://schemas.openxmlformats.org/officeDocument/2006/relationships" xmlns:p="http://schemas.openxmlformats.org/presentationml/2006/main">
+  <p:cSld>
+    <p:spTree>
+      <p:nvGrpSpPr>
+        <p:cNvPr id="1" name="Shape 57"/>
+        <p:cNvGrpSpPr/>
+        <p:nvPr/>
+      </p:nvGrpSpPr>
+      <p:grpSpPr>
+        <a:xfrm>
+          <a:off x="0" y="0"/>
+          <a:ext cx="0" cy="0"/>
+          <a:chOff x="0" y="0"/>
+          <a:chExt cx="0" cy="0"/>
+        </a:xfrm>
+      </p:grpSpPr>
+      <p:sp>
+        <p:nvSpPr>
+          <p:cNvPr id="58" name="Google Shape;58;p10"/>
+          <p:cNvSpPr txBox="1">
+            <a:spLocks noGrp="1"/>
+          </p:cNvSpPr>
+          <p:nvPr>
+            <p:ph type="title"/>
+          </p:nvPr>
+        </p:nvSpPr>
+        <p:spPr>
+          <a:xfrm>
+            <a:off x="311700" y="292625"/>
+            <a:ext cx="8520600" cy="572700"/>
+          </a:xfrm>
+          <a:prstGeom prst="rect">
+            <a:avLst/>
+          </a:prstGeom>
+        </p:spPr>
+        <p:txBody>
+          <a:bodyPr spcFirstLastPara="1" wrap="square" lIns="91425" tIns="91425" rIns="91425" bIns="91425" anchor="t" anchorCtr="0">
+            <a:normAutofit fontScale="90000"/>
+          </a:bodyPr>
+          <a:lstStyle/>
+          <a:p>
+            <a:pPr marL="0" lvl="0" indent="0" algn="l" rtl="0">
+              <a:spcBef>
+                <a:spcPts val="0"/>
+              </a:spcBef>
+              <a:spcAft>
+                <a:spcPts val="0"/>
+              </a:spcAft>
+              <a:buNone/>
+            </a:pPr>
+            <a:r>
+              <a:rPr lang="pt-BR"/>
+              <a:t>Requisitos, ambiente e recursos</a:t>
+            </a:r>
+            <a:endParaRPr/>
+          </a:p>
+        </p:txBody>
+      </p:sp>
+      <p:sp>
+        <p:nvSpPr>
+          <p:cNvPr id="59" name="Google Shape;59;p10"/>
+          <p:cNvSpPr txBox="1">
+            <a:spLocks noGrp="1"/>
+          </p:cNvSpPr>
+          <p:nvPr>
+            <p:ph type="body" idx="1"/>
+          </p:nvPr>
+        </p:nvSpPr>
+        <p:spPr>
+          <a:xfrm>
+            <a:off x="311700" y="1000075"/>
+            <a:ext cx="8520600" cy="3416400"/>
+          </a:xfrm>
+          <a:prstGeom prst="rect">
+            <a:avLst/>
+          </a:prstGeom>
+        </p:spPr>
+        <p:txBody>
+          <a:bodyPr spcFirstLastPara="1" wrap="square" lIns="91425" tIns="91425" rIns="91425" bIns="91425" anchor="t" anchorCtr="0">
+            <a:normAutofit/>
+          </a:bodyPr>
+          <a:lstStyle/>
+          <a:p>
+            <a:pPr marL="457200" lvl="0" indent="-342900" algn="l" rtl="0">
+              <a:lnSpc>
+                <a:spcPct val="150000"/>
+              </a:lnSpc>
+              <a:spcBef>
+                <a:spcPts val="0"/>
+              </a:spcBef>
+              <a:spcAft>
+                <a:spcPts val="0"/>
+              </a:spcAft>
+              <a:buSzPts val="1800"/>
+              <a:buChar char="●"/>
+            </a:pPr>
+            <a:r>
+              <a:rPr lang="pt-BR" dirty="0"/>
+              <a:t>Ambiente e recursos necessários:</a:t>
+            </a:r>
+            <a:endParaRPr dirty="0"/>
+          </a:p>
+          <a:p>
+            <a:pPr marL="914400" lvl="1" indent="-317500" algn="l" rtl="0">
+              <a:lnSpc>
+                <a:spcPct val="150000"/>
+              </a:lnSpc>
+              <a:spcBef>
+                <a:spcPts val="0"/>
+              </a:spcBef>
+              <a:spcAft>
+                <a:spcPts val="0"/>
+              </a:spcAft>
+              <a:buSzPts val="1400"/>
+              <a:buChar char="○"/>
+            </a:pPr>
+            <a:r>
+              <a:rPr lang="pt-BR" dirty="0"/>
+              <a:t>Java 11+</a:t>
+            </a:r>
+            <a:r>
+              <a:rPr lang="pt-BR" sz="1400" dirty="0"/>
+              <a:t>;</a:t>
+            </a:r>
+          </a:p>
+          <a:p>
+            <a:pPr marL="914400" lvl="1" indent="-317500" algn="l" rtl="0">
+              <a:lnSpc>
+                <a:spcPct val="150000"/>
+              </a:lnSpc>
+              <a:spcBef>
+                <a:spcPts val="0"/>
+              </a:spcBef>
+              <a:spcAft>
+                <a:spcPts val="0"/>
+              </a:spcAft>
+              <a:buSzPts val="1400"/>
+              <a:buChar char="○"/>
+            </a:pPr>
+            <a:r>
+              <a:rPr lang="pt-BR" dirty="0"/>
+              <a:t>Seu editor de código de preferência (No meu caso, </a:t>
+            </a:r>
+            <a:r>
+              <a:rPr lang="pt-BR" dirty="0" err="1"/>
+              <a:t>Intellij</a:t>
+            </a:r>
+            <a:r>
+              <a:rPr lang="pt-BR" dirty="0"/>
+              <a:t>)</a:t>
+            </a:r>
+            <a:r>
+              <a:rPr lang="pt-BR" sz="1400" dirty="0"/>
+              <a:t>;</a:t>
+            </a:r>
+            <a:endParaRPr sz="1400" dirty="0"/>
+          </a:p>
+          <a:p>
+            <a:pPr marL="914400" lvl="1" indent="-317500" algn="l" rtl="0">
+              <a:lnSpc>
+                <a:spcPct val="150000"/>
+              </a:lnSpc>
+              <a:spcBef>
+                <a:spcPts val="0"/>
+              </a:spcBef>
+              <a:spcAft>
+                <a:spcPts val="0"/>
+              </a:spcAft>
+              <a:buSzPts val="1400"/>
+              <a:buChar char="○"/>
+            </a:pPr>
+            <a:r>
+              <a:rPr lang="pt-BR" dirty="0"/>
+              <a:t>Vontade de aprender :D</a:t>
+            </a:r>
+          </a:p>
+        </p:txBody>
+      </p:sp>
+    </p:spTree>
+    <p:extLst>
+      <p:ext uri="{BB962C8B-B14F-4D97-AF65-F5344CB8AC3E}">
+        <p14:creationId xmlns:p14="http://schemas.microsoft.com/office/powerpoint/2010/main" val="2166939777"/>
+      </p:ext>
+    </p:extLst>
   </p:cSld>
   <p:clrMapOvr>
     <a:masterClrMapping/>

</xml_diff>